<commit_message>
manu's change to the ROS ontology
</commit_message>
<xml_diff>
--- a/data/meeting_2017_05_09.pptx
+++ b/data/meeting_2017_05_09.pptx
@@ -4,6 +4,9 @@
   <p:sldMasterIdLst>
     <p:sldMasterId id="2147483648" r:id="rId1"/>
   </p:sldMasterIdLst>
+  <p:notesMasterIdLst>
+    <p:notesMasterId r:id="rId12"/>
+  </p:notesMasterIdLst>
   <p:sldIdLst>
     <p:sldId id="256" r:id="rId2"/>
     <p:sldId id="257" r:id="rId3"/>
@@ -115,7 +118,7 @@
   </p:defaultTextStyle>
   <p:extLst>
     <p:ext uri="{EFAFB233-063F-42B5-8137-9DF3F51BA10A}">
-      <p15:sldGuideLst xmlns:p15="http://schemas.microsoft.com/office/powerpoint/2012/main">
+      <p15:sldGuideLst xmlns:p15="http://schemas.microsoft.com/office/powerpoint/2012/main" xmlns="">
         <p15:guide id="1" orient="horz" pos="2160" userDrawn="1">
           <p15:clr>
             <a:srgbClr val="A4A3A4"/>
@@ -130,6 +133,440 @@
     </p:ext>
   </p:extLst>
 </p:presentation>
+</file>
+
+<file path=ppt/notesMasters/notesMaster1.xml><?xml version="1.0" encoding="utf-8"?>
+<p:notesMaster xmlns:a="http://schemas.openxmlformats.org/drawingml/2006/main" xmlns:r="http://schemas.openxmlformats.org/officeDocument/2006/relationships" xmlns:p="http://schemas.openxmlformats.org/presentationml/2006/main">
+  <p:cSld>
+    <p:bg>
+      <p:bgRef idx="1001">
+        <a:schemeClr val="bg1"/>
+      </p:bgRef>
+    </p:bg>
+    <p:spTree>
+      <p:nvGrpSpPr>
+        <p:cNvPr id="1" name=""/>
+        <p:cNvGrpSpPr/>
+        <p:nvPr/>
+      </p:nvGrpSpPr>
+      <p:grpSpPr>
+        <a:xfrm>
+          <a:off x="0" y="0"/>
+          <a:ext cx="0" cy="0"/>
+          <a:chOff x="0" y="0"/>
+          <a:chExt cx="0" cy="0"/>
+        </a:xfrm>
+      </p:grpSpPr>
+      <p:sp>
+        <p:nvSpPr>
+          <p:cNvPr id="2" name="Header Placeholder 1"/>
+          <p:cNvSpPr>
+            <a:spLocks noGrp="1"/>
+          </p:cNvSpPr>
+          <p:nvPr>
+            <p:ph type="hdr" sz="quarter"/>
+          </p:nvPr>
+        </p:nvSpPr>
+        <p:spPr>
+          <a:xfrm>
+            <a:off x="0" y="0"/>
+            <a:ext cx="2971800" cy="457200"/>
+          </a:xfrm>
+          <a:prstGeom prst="rect">
+            <a:avLst/>
+          </a:prstGeom>
+        </p:spPr>
+        <p:txBody>
+          <a:bodyPr vert="horz" lIns="91440" tIns="45720" rIns="91440" bIns="45720" rtlCol="0"/>
+          <a:lstStyle>
+            <a:lvl1pPr algn="l">
+              <a:defRPr sz="1200"/>
+            </a:lvl1pPr>
+          </a:lstStyle>
+          <a:p>
+            <a:endParaRPr lang="en-US"/>
+          </a:p>
+        </p:txBody>
+      </p:sp>
+      <p:sp>
+        <p:nvSpPr>
+          <p:cNvPr id="3" name="Date Placeholder 2"/>
+          <p:cNvSpPr>
+            <a:spLocks noGrp="1"/>
+          </p:cNvSpPr>
+          <p:nvPr>
+            <p:ph type="dt" idx="1"/>
+          </p:nvPr>
+        </p:nvSpPr>
+        <p:spPr>
+          <a:xfrm>
+            <a:off x="3884613" y="0"/>
+            <a:ext cx="2971800" cy="457200"/>
+          </a:xfrm>
+          <a:prstGeom prst="rect">
+            <a:avLst/>
+          </a:prstGeom>
+        </p:spPr>
+        <p:txBody>
+          <a:bodyPr vert="horz" lIns="91440" tIns="45720" rIns="91440" bIns="45720" rtlCol="0"/>
+          <a:lstStyle>
+            <a:lvl1pPr algn="r">
+              <a:defRPr sz="1200"/>
+            </a:lvl1pPr>
+          </a:lstStyle>
+          <a:p>
+            <a:fld id="{5A9D7615-AE50-4A4C-9A52-7966B6541187}" type="datetimeFigureOut">
+              <a:rPr lang="en-US" smtClean="0"/>
+              <a:t>09/05/17</a:t>
+            </a:fld>
+            <a:endParaRPr lang="en-US"/>
+          </a:p>
+        </p:txBody>
+      </p:sp>
+      <p:sp>
+        <p:nvSpPr>
+          <p:cNvPr id="4" name="Slide Image Placeholder 3"/>
+          <p:cNvSpPr>
+            <a:spLocks noGrp="1" noRot="1" noChangeAspect="1"/>
+          </p:cNvSpPr>
+          <p:nvPr>
+            <p:ph type="sldImg" idx="2"/>
+          </p:nvPr>
+        </p:nvSpPr>
+        <p:spPr>
+          <a:xfrm>
+            <a:off x="381000" y="685800"/>
+            <a:ext cx="6096000" cy="3429000"/>
+          </a:xfrm>
+          <a:prstGeom prst="rect">
+            <a:avLst/>
+          </a:prstGeom>
+          <a:noFill/>
+          <a:ln w="12700">
+            <a:solidFill>
+              <a:prstClr val="black"/>
+            </a:solidFill>
+          </a:ln>
+        </p:spPr>
+        <p:txBody>
+          <a:bodyPr vert="horz" lIns="91440" tIns="45720" rIns="91440" bIns="45720" rtlCol="0" anchor="ctr"/>
+          <a:lstStyle/>
+          <a:p>
+            <a:endParaRPr lang="en-US"/>
+          </a:p>
+        </p:txBody>
+      </p:sp>
+      <p:sp>
+        <p:nvSpPr>
+          <p:cNvPr id="5" name="Notes Placeholder 4"/>
+          <p:cNvSpPr>
+            <a:spLocks noGrp="1"/>
+          </p:cNvSpPr>
+          <p:nvPr>
+            <p:ph type="body" sz="quarter" idx="3"/>
+          </p:nvPr>
+        </p:nvSpPr>
+        <p:spPr>
+          <a:xfrm>
+            <a:off x="685800" y="4343400"/>
+            <a:ext cx="5486400" cy="4114800"/>
+          </a:xfrm>
+          <a:prstGeom prst="rect">
+            <a:avLst/>
+          </a:prstGeom>
+        </p:spPr>
+        <p:txBody>
+          <a:bodyPr vert="horz" lIns="91440" tIns="45720" rIns="91440" bIns="45720" rtlCol="0"/>
+          <a:lstStyle/>
+          <a:p>
+            <a:pPr lvl="0"/>
+            <a:r>
+              <a:rPr lang="en-GB" smtClean="0"/>
+              <a:t>Click to edit Master text styles</a:t>
+            </a:r>
+          </a:p>
+          <a:p>
+            <a:pPr lvl="1"/>
+            <a:r>
+              <a:rPr lang="en-GB" smtClean="0"/>
+              <a:t>Second level</a:t>
+            </a:r>
+          </a:p>
+          <a:p>
+            <a:pPr lvl="2"/>
+            <a:r>
+              <a:rPr lang="en-GB" smtClean="0"/>
+              <a:t>Third level</a:t>
+            </a:r>
+          </a:p>
+          <a:p>
+            <a:pPr lvl="3"/>
+            <a:r>
+              <a:rPr lang="en-GB" smtClean="0"/>
+              <a:t>Fourth level</a:t>
+            </a:r>
+          </a:p>
+          <a:p>
+            <a:pPr lvl="4"/>
+            <a:r>
+              <a:rPr lang="en-GB" smtClean="0"/>
+              <a:t>Fifth level</a:t>
+            </a:r>
+            <a:endParaRPr lang="en-US"/>
+          </a:p>
+        </p:txBody>
+      </p:sp>
+      <p:sp>
+        <p:nvSpPr>
+          <p:cNvPr id="6" name="Footer Placeholder 5"/>
+          <p:cNvSpPr>
+            <a:spLocks noGrp="1"/>
+          </p:cNvSpPr>
+          <p:nvPr>
+            <p:ph type="ftr" sz="quarter" idx="4"/>
+          </p:nvPr>
+        </p:nvSpPr>
+        <p:spPr>
+          <a:xfrm>
+            <a:off x="0" y="8685213"/>
+            <a:ext cx="2971800" cy="457200"/>
+          </a:xfrm>
+          <a:prstGeom prst="rect">
+            <a:avLst/>
+          </a:prstGeom>
+        </p:spPr>
+        <p:txBody>
+          <a:bodyPr vert="horz" lIns="91440" tIns="45720" rIns="91440" bIns="45720" rtlCol="0" anchor="b"/>
+          <a:lstStyle>
+            <a:lvl1pPr algn="l">
+              <a:defRPr sz="1200"/>
+            </a:lvl1pPr>
+          </a:lstStyle>
+          <a:p>
+            <a:endParaRPr lang="en-US"/>
+          </a:p>
+        </p:txBody>
+      </p:sp>
+      <p:sp>
+        <p:nvSpPr>
+          <p:cNvPr id="7" name="Slide Number Placeholder 6"/>
+          <p:cNvSpPr>
+            <a:spLocks noGrp="1"/>
+          </p:cNvSpPr>
+          <p:nvPr>
+            <p:ph type="sldNum" sz="quarter" idx="5"/>
+          </p:nvPr>
+        </p:nvSpPr>
+        <p:spPr>
+          <a:xfrm>
+            <a:off x="3884613" y="8685213"/>
+            <a:ext cx="2971800" cy="457200"/>
+          </a:xfrm>
+          <a:prstGeom prst="rect">
+            <a:avLst/>
+          </a:prstGeom>
+        </p:spPr>
+        <p:txBody>
+          <a:bodyPr vert="horz" lIns="91440" tIns="45720" rIns="91440" bIns="45720" rtlCol="0" anchor="b"/>
+          <a:lstStyle>
+            <a:lvl1pPr algn="r">
+              <a:defRPr sz="1200"/>
+            </a:lvl1pPr>
+          </a:lstStyle>
+          <a:p>
+            <a:fld id="{1FA29E91-18D8-9445-BB50-C92D79064E44}" type="slidenum">
+              <a:rPr lang="en-US" smtClean="0"/>
+              <a:t>‹#›</a:t>
+            </a:fld>
+            <a:endParaRPr lang="en-US"/>
+          </a:p>
+        </p:txBody>
+      </p:sp>
+    </p:spTree>
+    <p:extLst>
+      <p:ext uri="{BB962C8B-B14F-4D97-AF65-F5344CB8AC3E}">
+        <p14:creationId xmlns:p14="http://schemas.microsoft.com/office/powerpoint/2010/main" val="1405188061"/>
+      </p:ext>
+    </p:extLst>
+  </p:cSld>
+  <p:clrMap bg1="lt1" tx1="dk1" bg2="lt2" tx2="dk2" accent1="accent1" accent2="accent2" accent3="accent3" accent4="accent4" accent5="accent5" accent6="accent6" hlink="hlink" folHlink="folHlink"/>
+  <p:notesStyle>
+    <a:lvl1pPr marL="0" algn="l" defTabSz="457200" rtl="0" eaLnBrk="1" latinLnBrk="0" hangingPunct="1">
+      <a:defRPr sz="1200" kern="1200">
+        <a:solidFill>
+          <a:schemeClr val="tx1"/>
+        </a:solidFill>
+        <a:latin typeface="+mn-lt"/>
+        <a:ea typeface="+mn-ea"/>
+        <a:cs typeface="+mn-cs"/>
+      </a:defRPr>
+    </a:lvl1pPr>
+    <a:lvl2pPr marL="457200" algn="l" defTabSz="457200" rtl="0" eaLnBrk="1" latinLnBrk="0" hangingPunct="1">
+      <a:defRPr sz="1200" kern="1200">
+        <a:solidFill>
+          <a:schemeClr val="tx1"/>
+        </a:solidFill>
+        <a:latin typeface="+mn-lt"/>
+        <a:ea typeface="+mn-ea"/>
+        <a:cs typeface="+mn-cs"/>
+      </a:defRPr>
+    </a:lvl2pPr>
+    <a:lvl3pPr marL="914400" algn="l" defTabSz="457200" rtl="0" eaLnBrk="1" latinLnBrk="0" hangingPunct="1">
+      <a:defRPr sz="1200" kern="1200">
+        <a:solidFill>
+          <a:schemeClr val="tx1"/>
+        </a:solidFill>
+        <a:latin typeface="+mn-lt"/>
+        <a:ea typeface="+mn-ea"/>
+        <a:cs typeface="+mn-cs"/>
+      </a:defRPr>
+    </a:lvl3pPr>
+    <a:lvl4pPr marL="1371600" algn="l" defTabSz="457200" rtl="0" eaLnBrk="1" latinLnBrk="0" hangingPunct="1">
+      <a:defRPr sz="1200" kern="1200">
+        <a:solidFill>
+          <a:schemeClr val="tx1"/>
+        </a:solidFill>
+        <a:latin typeface="+mn-lt"/>
+        <a:ea typeface="+mn-ea"/>
+        <a:cs typeface="+mn-cs"/>
+      </a:defRPr>
+    </a:lvl4pPr>
+    <a:lvl5pPr marL="1828800" algn="l" defTabSz="457200" rtl="0" eaLnBrk="1" latinLnBrk="0" hangingPunct="1">
+      <a:defRPr sz="1200" kern="1200">
+        <a:solidFill>
+          <a:schemeClr val="tx1"/>
+        </a:solidFill>
+        <a:latin typeface="+mn-lt"/>
+        <a:ea typeface="+mn-ea"/>
+        <a:cs typeface="+mn-cs"/>
+      </a:defRPr>
+    </a:lvl5pPr>
+    <a:lvl6pPr marL="2286000" algn="l" defTabSz="457200" rtl="0" eaLnBrk="1" latinLnBrk="0" hangingPunct="1">
+      <a:defRPr sz="1200" kern="1200">
+        <a:solidFill>
+          <a:schemeClr val="tx1"/>
+        </a:solidFill>
+        <a:latin typeface="+mn-lt"/>
+        <a:ea typeface="+mn-ea"/>
+        <a:cs typeface="+mn-cs"/>
+      </a:defRPr>
+    </a:lvl6pPr>
+    <a:lvl7pPr marL="2743200" algn="l" defTabSz="457200" rtl="0" eaLnBrk="1" latinLnBrk="0" hangingPunct="1">
+      <a:defRPr sz="1200" kern="1200">
+        <a:solidFill>
+          <a:schemeClr val="tx1"/>
+        </a:solidFill>
+        <a:latin typeface="+mn-lt"/>
+        <a:ea typeface="+mn-ea"/>
+        <a:cs typeface="+mn-cs"/>
+      </a:defRPr>
+    </a:lvl7pPr>
+    <a:lvl8pPr marL="3200400" algn="l" defTabSz="457200" rtl="0" eaLnBrk="1" latinLnBrk="0" hangingPunct="1">
+      <a:defRPr sz="1200" kern="1200">
+        <a:solidFill>
+          <a:schemeClr val="tx1"/>
+        </a:solidFill>
+        <a:latin typeface="+mn-lt"/>
+        <a:ea typeface="+mn-ea"/>
+        <a:cs typeface="+mn-cs"/>
+      </a:defRPr>
+    </a:lvl8pPr>
+    <a:lvl9pPr marL="3657600" algn="l" defTabSz="457200" rtl="0" eaLnBrk="1" latinLnBrk="0" hangingPunct="1">
+      <a:defRPr sz="1200" kern="1200">
+        <a:solidFill>
+          <a:schemeClr val="tx1"/>
+        </a:solidFill>
+        <a:latin typeface="+mn-lt"/>
+        <a:ea typeface="+mn-ea"/>
+        <a:cs typeface="+mn-cs"/>
+      </a:defRPr>
+    </a:lvl9pPr>
+  </p:notesStyle>
+</p:notesMaster>
+</file>
+
+<file path=ppt/notesSlides/notesSlide1.xml><?xml version="1.0" encoding="utf-8"?>
+<p:notes xmlns:a="http://schemas.openxmlformats.org/drawingml/2006/main" xmlns:r="http://schemas.openxmlformats.org/officeDocument/2006/relationships" xmlns:p="http://schemas.openxmlformats.org/presentationml/2006/main">
+  <p:cSld>
+    <p:spTree>
+      <p:nvGrpSpPr>
+        <p:cNvPr id="1" name=""/>
+        <p:cNvGrpSpPr/>
+        <p:nvPr/>
+      </p:nvGrpSpPr>
+      <p:grpSpPr>
+        <a:xfrm>
+          <a:off x="0" y="0"/>
+          <a:ext cx="0" cy="0"/>
+          <a:chOff x="0" y="0"/>
+          <a:chExt cx="0" cy="0"/>
+        </a:xfrm>
+      </p:grpSpPr>
+      <p:sp>
+        <p:nvSpPr>
+          <p:cNvPr id="2" name="Slide Image Placeholder 1"/>
+          <p:cNvSpPr>
+            <a:spLocks noGrp="1" noRot="1" noChangeAspect="1"/>
+          </p:cNvSpPr>
+          <p:nvPr>
+            <p:ph type="sldImg"/>
+          </p:nvPr>
+        </p:nvSpPr>
+        <p:spPr/>
+      </p:sp>
+      <p:sp>
+        <p:nvSpPr>
+          <p:cNvPr id="3" name="Notes Placeholder 2"/>
+          <p:cNvSpPr>
+            <a:spLocks noGrp="1"/>
+          </p:cNvSpPr>
+          <p:nvPr>
+            <p:ph type="body" idx="1"/>
+          </p:nvPr>
+        </p:nvSpPr>
+        <p:spPr/>
+        <p:txBody>
+          <a:bodyPr/>
+          <a:lstStyle/>
+          <a:p>
+            <a:endParaRPr lang="en-US" dirty="0"/>
+          </a:p>
+        </p:txBody>
+      </p:sp>
+      <p:sp>
+        <p:nvSpPr>
+          <p:cNvPr id="4" name="Slide Number Placeholder 3"/>
+          <p:cNvSpPr>
+            <a:spLocks noGrp="1"/>
+          </p:cNvSpPr>
+          <p:nvPr>
+            <p:ph type="sldNum" sz="quarter" idx="10"/>
+          </p:nvPr>
+        </p:nvSpPr>
+        <p:spPr/>
+        <p:txBody>
+          <a:bodyPr/>
+          <a:lstStyle/>
+          <a:p>
+            <a:fld id="{1FA29E91-18D8-9445-BB50-C92D79064E44}" type="slidenum">
+              <a:rPr lang="en-US" smtClean="0"/>
+              <a:t>9</a:t>
+            </a:fld>
+            <a:endParaRPr lang="en-US"/>
+          </a:p>
+        </p:txBody>
+      </p:sp>
+    </p:spTree>
+    <p:extLst>
+      <p:ext uri="{BB962C8B-B14F-4D97-AF65-F5344CB8AC3E}">
+        <p14:creationId xmlns:p14="http://schemas.microsoft.com/office/powerpoint/2010/main" val="3332038787"/>
+      </p:ext>
+    </p:extLst>
+  </p:cSld>
+  <p:clrMapOvr>
+    <a:masterClrMapping/>
+  </p:clrMapOvr>
+</p:notes>
 </file>
 
 <file path=ppt/slideLayouts/slideLayout1.xml><?xml version="1.0" encoding="utf-8"?>
@@ -313,7 +750,7 @@
           <a:p>
             <a:fld id="{A2B7AEEE-8D0D-C145-BF37-1B117393FF51}" type="datetimeFigureOut">
               <a:rPr lang="en-US" smtClean="0"/>
-              <a:t>5/8/2017</a:t>
+              <a:t>09/05/17</a:t>
             </a:fld>
             <a:endParaRPr lang="en-US"/>
           </a:p>
@@ -483,7 +920,7 @@
           <a:p>
             <a:fld id="{A2B7AEEE-8D0D-C145-BF37-1B117393FF51}" type="datetimeFigureOut">
               <a:rPr lang="en-US" smtClean="0"/>
-              <a:t>5/8/2017</a:t>
+              <a:t>09/05/17</a:t>
             </a:fld>
             <a:endParaRPr lang="en-US"/>
           </a:p>
@@ -663,7 +1100,7 @@
           <a:p>
             <a:fld id="{A2B7AEEE-8D0D-C145-BF37-1B117393FF51}" type="datetimeFigureOut">
               <a:rPr lang="en-US" smtClean="0"/>
-              <a:t>5/8/2017</a:t>
+              <a:t>09/05/17</a:t>
             </a:fld>
             <a:endParaRPr lang="en-US"/>
           </a:p>
@@ -833,7 +1270,7 @@
           <a:p>
             <a:fld id="{A2B7AEEE-8D0D-C145-BF37-1B117393FF51}" type="datetimeFigureOut">
               <a:rPr lang="en-US" smtClean="0"/>
-              <a:t>5/8/2017</a:t>
+              <a:t>09/05/17</a:t>
             </a:fld>
             <a:endParaRPr lang="en-US"/>
           </a:p>
@@ -1079,7 +1516,7 @@
           <a:p>
             <a:fld id="{A2B7AEEE-8D0D-C145-BF37-1B117393FF51}" type="datetimeFigureOut">
               <a:rPr lang="en-US" smtClean="0"/>
-              <a:t>5/8/2017</a:t>
+              <a:t>09/05/17</a:t>
             </a:fld>
             <a:endParaRPr lang="en-US"/>
           </a:p>
@@ -1367,7 +1804,7 @@
           <a:p>
             <a:fld id="{A2B7AEEE-8D0D-C145-BF37-1B117393FF51}" type="datetimeFigureOut">
               <a:rPr lang="en-US" smtClean="0"/>
-              <a:t>5/8/2017</a:t>
+              <a:t>09/05/17</a:t>
             </a:fld>
             <a:endParaRPr lang="en-US"/>
           </a:p>
@@ -1789,7 +2226,7 @@
           <a:p>
             <a:fld id="{A2B7AEEE-8D0D-C145-BF37-1B117393FF51}" type="datetimeFigureOut">
               <a:rPr lang="en-US" smtClean="0"/>
-              <a:t>5/8/2017</a:t>
+              <a:t>09/05/17</a:t>
             </a:fld>
             <a:endParaRPr lang="en-US"/>
           </a:p>
@@ -1907,7 +2344,7 @@
           <a:p>
             <a:fld id="{A2B7AEEE-8D0D-C145-BF37-1B117393FF51}" type="datetimeFigureOut">
               <a:rPr lang="en-US" smtClean="0"/>
-              <a:t>5/8/2017</a:t>
+              <a:t>09/05/17</a:t>
             </a:fld>
             <a:endParaRPr lang="en-US"/>
           </a:p>
@@ -2002,7 +2439,7 @@
           <a:p>
             <a:fld id="{A2B7AEEE-8D0D-C145-BF37-1B117393FF51}" type="datetimeFigureOut">
               <a:rPr lang="en-US" smtClean="0"/>
-              <a:t>5/8/2017</a:t>
+              <a:t>09/05/17</a:t>
             </a:fld>
             <a:endParaRPr lang="en-US"/>
           </a:p>
@@ -2279,7 +2716,7 @@
           <a:p>
             <a:fld id="{A2B7AEEE-8D0D-C145-BF37-1B117393FF51}" type="datetimeFigureOut">
               <a:rPr lang="en-US" smtClean="0"/>
-              <a:t>5/8/2017</a:t>
+              <a:t>09/05/17</a:t>
             </a:fld>
             <a:endParaRPr lang="en-US"/>
           </a:p>
@@ -2532,7 +2969,7 @@
           <a:p>
             <a:fld id="{A2B7AEEE-8D0D-C145-BF37-1B117393FF51}" type="datetimeFigureOut">
               <a:rPr lang="en-US" smtClean="0"/>
-              <a:t>5/8/2017</a:t>
+              <a:t>09/05/17</a:t>
             </a:fld>
             <a:endParaRPr lang="en-US"/>
           </a:p>
@@ -2745,7 +3182,7 @@
           <a:p>
             <a:fld id="{A2B7AEEE-8D0D-C145-BF37-1B117393FF51}" type="datetimeFigureOut">
               <a:rPr lang="en-US" smtClean="0"/>
-              <a:t>5/8/2017</a:t>
+              <a:t>09/05/17</a:t>
             </a:fld>
             <a:endParaRPr lang="en-US"/>
           </a:p>
@@ -3143,25 +3580,6 @@
           </a:p>
         </p:txBody>
       </p:sp>
-      <p:sp>
-        <p:nvSpPr>
-          <p:cNvPr id="3" name="Subtitle 2"/>
-          <p:cNvSpPr>
-            <a:spLocks noGrp="1"/>
-          </p:cNvSpPr>
-          <p:nvPr>
-            <p:ph type="subTitle" idx="1"/>
-          </p:nvPr>
-        </p:nvSpPr>
-        <p:spPr/>
-        <p:txBody>
-          <a:bodyPr/>
-          <a:lstStyle/>
-          <a:p>
-            <a:endParaRPr lang="en-US"/>
-          </a:p>
-        </p:txBody>
-      </p:sp>
     </p:spTree>
     <p:extLst>
       <p:ext uri="{BB962C8B-B14F-4D97-AF65-F5344CB8AC3E}">
@@ -3172,6 +3590,13 @@
   <p:clrMapOvr>
     <a:masterClrMapping/>
   </p:clrMapOvr>
+  <p:timing>
+    <p:tnLst>
+      <p:par>
+        <p:cTn xmlns:p14="http://schemas.microsoft.com/office/powerpoint/2010/main" id="1" dur="indefinite" restart="never" nodeType="tmRoot"/>
+      </p:par>
+    </p:tnLst>
+  </p:timing>
 </p:sld>
 </file>
 
@@ -3294,6 +3719,13 @@
   <p:clrMapOvr>
     <a:masterClrMapping/>
   </p:clrMapOvr>
+  <p:timing>
+    <p:tnLst>
+      <p:par>
+        <p:cTn xmlns:p14="http://schemas.microsoft.com/office/powerpoint/2010/main" id="1" dur="indefinite" restart="never" nodeType="tmRoot"/>
+      </p:par>
+    </p:tnLst>
+  </p:timing>
 </p:sld>
 </file>
 
@@ -3391,6 +3823,13 @@
   <p:clrMapOvr>
     <a:masterClrMapping/>
   </p:clrMapOvr>
+  <p:timing>
+    <p:tnLst>
+      <p:par>
+        <p:cTn xmlns:p14="http://schemas.microsoft.com/office/powerpoint/2010/main" id="1" dur="indefinite" restart="never" nodeType="tmRoot"/>
+      </p:par>
+    </p:tnLst>
+  </p:timing>
 </p:sld>
 </file>
 
@@ -3480,7 +3919,15 @@
           <a:p>
             <a:r>
               <a:rPr lang="en-US" dirty="0" smtClean="0"/>
-              <a:t>This may lead to a required standardization (both in ROS and in designing </a:t>
+              <a:t>This may lead to a </a:t>
+            </a:r>
+            <a:r>
+              <a:rPr lang="en-US" i="1" dirty="0" smtClean="0"/>
+              <a:t>required</a:t>
+            </a:r>
+            <a:r>
+              <a:rPr lang="en-US" dirty="0" smtClean="0"/>
+              <a:t> standardization (both in ROS and in designing </a:t>
             </a:r>
             <a:r>
               <a:rPr lang="en-US" dirty="0"/>
@@ -3511,6 +3958,13 @@
   <p:clrMapOvr>
     <a:masterClrMapping/>
   </p:clrMapOvr>
+  <p:timing>
+    <p:tnLst>
+      <p:par>
+        <p:cTn xmlns:p14="http://schemas.microsoft.com/office/powerpoint/2010/main" id="1" dur="indefinite" restart="never" nodeType="tmRoot"/>
+      </p:par>
+    </p:tnLst>
+  </p:timing>
 </p:sld>
 </file>
 
@@ -3805,6 +4259,13 @@
   <p:clrMapOvr>
     <a:masterClrMapping/>
   </p:clrMapOvr>
+  <p:timing>
+    <p:tnLst>
+      <p:par>
+        <p:cTn xmlns:p14="http://schemas.microsoft.com/office/powerpoint/2010/main" id="1" dur="indefinite" restart="never" nodeType="tmRoot"/>
+      </p:par>
+    </p:tnLst>
+  </p:timing>
 </p:sld>
 </file>
 
@@ -4612,6 +5073,13 @@
   <p:clrMapOvr>
     <a:masterClrMapping/>
   </p:clrMapOvr>
+  <p:timing>
+    <p:tnLst>
+      <p:par>
+        <p:cTn xmlns:p14="http://schemas.microsoft.com/office/powerpoint/2010/main" id="1" dur="indefinite" restart="never" nodeType="tmRoot"/>
+      </p:par>
+    </p:tnLst>
+  </p:timing>
 </p:sld>
 </file>
 
@@ -5392,6 +5860,13 @@
   <p:clrMapOvr>
     <a:masterClrMapping/>
   </p:clrMapOvr>
+  <p:timing>
+    <p:tnLst>
+      <p:par>
+        <p:cTn xmlns:p14="http://schemas.microsoft.com/office/powerpoint/2010/main" id="1" dur="indefinite" restart="never" nodeType="tmRoot"/>
+      </p:par>
+    </p:tnLst>
+  </p:timing>
 </p:sld>
 </file>
 
@@ -5437,22 +5912,1576 @@
       </p:sp>
       <p:sp>
         <p:nvSpPr>
-          <p:cNvPr id="3" name="Content Placeholder 2"/>
-          <p:cNvSpPr>
-            <a:spLocks noGrp="1"/>
-          </p:cNvSpPr>
-          <p:nvPr>
-            <p:ph idx="1"/>
-          </p:nvPr>
-        </p:nvSpPr>
-        <p:spPr/>
-        <p:txBody>
-          <a:bodyPr/>
-          <a:lstStyle/>
-          <a:p>
+          <p:cNvPr id="4" name="Rectangle 3"/>
+          <p:cNvSpPr/>
+          <p:nvPr/>
+        </p:nvSpPr>
+        <p:spPr>
+          <a:xfrm>
+            <a:off x="503647" y="1403368"/>
+            <a:ext cx="1371104" cy="582503"/>
+          </a:xfrm>
+          <a:prstGeom prst="rect">
+            <a:avLst/>
+          </a:prstGeom>
+        </p:spPr>
+        <p:style>
+          <a:lnRef idx="1">
+            <a:schemeClr val="accent1"/>
+          </a:lnRef>
+          <a:fillRef idx="3">
+            <a:schemeClr val="accent1"/>
+          </a:fillRef>
+          <a:effectRef idx="2">
+            <a:schemeClr val="accent1"/>
+          </a:effectRef>
+          <a:fontRef idx="minor">
+            <a:schemeClr val="lt1"/>
+          </a:fontRef>
+        </p:style>
+        <p:txBody>
+          <a:bodyPr rtlCol="0" anchor="ctr"/>
+          <a:lstStyle/>
+          <a:p>
+            <a:pPr algn="ctr"/>
             <a:r>
               <a:rPr lang="en-US" dirty="0" smtClean="0"/>
-              <a:t>Ontological representation of ROS</a:t>
+              <a:t>Node</a:t>
+            </a:r>
+            <a:endParaRPr lang="en-US" dirty="0"/>
+          </a:p>
+        </p:txBody>
+      </p:sp>
+      <p:sp>
+        <p:nvSpPr>
+          <p:cNvPr id="7" name="Rectangle 6"/>
+          <p:cNvSpPr/>
+          <p:nvPr/>
+        </p:nvSpPr>
+        <p:spPr>
+          <a:xfrm>
+            <a:off x="3989169" y="2490588"/>
+            <a:ext cx="1781578" cy="582503"/>
+          </a:xfrm>
+          <a:prstGeom prst="rect">
+            <a:avLst/>
+          </a:prstGeom>
+        </p:spPr>
+        <p:style>
+          <a:lnRef idx="1">
+            <a:schemeClr val="accent1"/>
+          </a:lnRef>
+          <a:fillRef idx="3">
+            <a:schemeClr val="accent1"/>
+          </a:fillRef>
+          <a:effectRef idx="2">
+            <a:schemeClr val="accent1"/>
+          </a:effectRef>
+          <a:fontRef idx="minor">
+            <a:schemeClr val="lt1"/>
+          </a:fontRef>
+        </p:style>
+        <p:txBody>
+          <a:bodyPr rtlCol="0" anchor="ctr"/>
+          <a:lstStyle/>
+          <a:p>
+            <a:pPr algn="ctr"/>
+            <a:r>
+              <a:rPr lang="en-US" dirty="0" smtClean="0"/>
+              <a:t>Communication component</a:t>
+            </a:r>
+            <a:endParaRPr lang="en-US" dirty="0"/>
+          </a:p>
+        </p:txBody>
+      </p:sp>
+      <p:sp>
+        <p:nvSpPr>
+          <p:cNvPr id="8" name="Rectangle 7"/>
+          <p:cNvSpPr/>
+          <p:nvPr/>
+        </p:nvSpPr>
+        <p:spPr>
+          <a:xfrm>
+            <a:off x="2338093" y="3775284"/>
+            <a:ext cx="1502712" cy="582503"/>
+          </a:xfrm>
+          <a:prstGeom prst="rect">
+            <a:avLst/>
+          </a:prstGeom>
+        </p:spPr>
+        <p:style>
+          <a:lnRef idx="1">
+            <a:schemeClr val="accent1"/>
+          </a:lnRef>
+          <a:fillRef idx="3">
+            <a:schemeClr val="accent1"/>
+          </a:fillRef>
+          <a:effectRef idx="2">
+            <a:schemeClr val="accent1"/>
+          </a:effectRef>
+          <a:fontRef idx="minor">
+            <a:schemeClr val="lt1"/>
+          </a:fontRef>
+        </p:style>
+        <p:txBody>
+          <a:bodyPr rtlCol="0" anchor="ctr"/>
+          <a:lstStyle/>
+          <a:p>
+            <a:pPr algn="ctr"/>
+            <a:r>
+              <a:rPr lang="en-US" dirty="0" err="1" smtClean="0"/>
+              <a:t>ServiceClient</a:t>
+            </a:r>
+            <a:endParaRPr lang="en-US" dirty="0"/>
+          </a:p>
+        </p:txBody>
+      </p:sp>
+      <p:sp>
+        <p:nvSpPr>
+          <p:cNvPr id="9" name="Rectangle 8"/>
+          <p:cNvSpPr/>
+          <p:nvPr/>
+        </p:nvSpPr>
+        <p:spPr>
+          <a:xfrm>
+            <a:off x="4195262" y="3789040"/>
+            <a:ext cx="1520075" cy="582503"/>
+          </a:xfrm>
+          <a:prstGeom prst="rect">
+            <a:avLst/>
+          </a:prstGeom>
+        </p:spPr>
+        <p:style>
+          <a:lnRef idx="1">
+            <a:schemeClr val="accent1"/>
+          </a:lnRef>
+          <a:fillRef idx="3">
+            <a:schemeClr val="accent1"/>
+          </a:fillRef>
+          <a:effectRef idx="2">
+            <a:schemeClr val="accent1"/>
+          </a:effectRef>
+          <a:fontRef idx="minor">
+            <a:schemeClr val="lt1"/>
+          </a:fontRef>
+        </p:style>
+        <p:txBody>
+          <a:bodyPr rtlCol="0" anchor="ctr"/>
+          <a:lstStyle/>
+          <a:p>
+            <a:pPr algn="ctr"/>
+            <a:r>
+              <a:rPr lang="en-US" dirty="0" err="1" smtClean="0"/>
+              <a:t>ServiceServer</a:t>
+            </a:r>
+            <a:endParaRPr lang="en-US" dirty="0"/>
+          </a:p>
+        </p:txBody>
+      </p:sp>
+      <p:sp>
+        <p:nvSpPr>
+          <p:cNvPr id="10" name="Rectangle 9"/>
+          <p:cNvSpPr/>
+          <p:nvPr/>
+        </p:nvSpPr>
+        <p:spPr>
+          <a:xfrm>
+            <a:off x="7141242" y="4210118"/>
+            <a:ext cx="1371104" cy="582503"/>
+          </a:xfrm>
+          <a:prstGeom prst="rect">
+            <a:avLst/>
+          </a:prstGeom>
+        </p:spPr>
+        <p:style>
+          <a:lnRef idx="1">
+            <a:schemeClr val="accent1"/>
+          </a:lnRef>
+          <a:fillRef idx="3">
+            <a:schemeClr val="accent1"/>
+          </a:fillRef>
+          <a:effectRef idx="2">
+            <a:schemeClr val="accent1"/>
+          </a:effectRef>
+          <a:fontRef idx="minor">
+            <a:schemeClr val="lt1"/>
+          </a:fontRef>
+        </p:style>
+        <p:txBody>
+          <a:bodyPr rtlCol="0" anchor="ctr"/>
+          <a:lstStyle/>
+          <a:p>
+            <a:pPr algn="ctr"/>
+            <a:r>
+              <a:rPr lang="en-US" dirty="0" smtClean="0"/>
+              <a:t>Publisher</a:t>
+            </a:r>
+            <a:endParaRPr lang="en-US" dirty="0"/>
+          </a:p>
+        </p:txBody>
+      </p:sp>
+      <p:sp>
+        <p:nvSpPr>
+          <p:cNvPr id="11" name="Rectangle 10"/>
+          <p:cNvSpPr/>
+          <p:nvPr/>
+        </p:nvSpPr>
+        <p:spPr>
+          <a:xfrm>
+            <a:off x="7313577" y="3053049"/>
+            <a:ext cx="1371104" cy="582503"/>
+          </a:xfrm>
+          <a:prstGeom prst="rect">
+            <a:avLst/>
+          </a:prstGeom>
+        </p:spPr>
+        <p:style>
+          <a:lnRef idx="1">
+            <a:schemeClr val="accent1"/>
+          </a:lnRef>
+          <a:fillRef idx="3">
+            <a:schemeClr val="accent1"/>
+          </a:fillRef>
+          <a:effectRef idx="2">
+            <a:schemeClr val="accent1"/>
+          </a:effectRef>
+          <a:fontRef idx="minor">
+            <a:schemeClr val="lt1"/>
+          </a:fontRef>
+        </p:style>
+        <p:txBody>
+          <a:bodyPr rtlCol="0" anchor="ctr"/>
+          <a:lstStyle/>
+          <a:p>
+            <a:pPr algn="ctr"/>
+            <a:r>
+              <a:rPr lang="en-US" dirty="0" smtClean="0"/>
+              <a:t>Subscriber</a:t>
+            </a:r>
+            <a:endParaRPr lang="en-US" dirty="0"/>
+          </a:p>
+        </p:txBody>
+      </p:sp>
+      <p:sp>
+        <p:nvSpPr>
+          <p:cNvPr id="12" name="Rectangle 11"/>
+          <p:cNvSpPr/>
+          <p:nvPr/>
+        </p:nvSpPr>
+        <p:spPr>
+          <a:xfrm>
+            <a:off x="10416480" y="4889700"/>
+            <a:ext cx="1371104" cy="582503"/>
+          </a:xfrm>
+          <a:prstGeom prst="rect">
+            <a:avLst/>
+          </a:prstGeom>
+        </p:spPr>
+        <p:style>
+          <a:lnRef idx="1">
+            <a:schemeClr val="accent1"/>
+          </a:lnRef>
+          <a:fillRef idx="3">
+            <a:schemeClr val="accent1"/>
+          </a:fillRef>
+          <a:effectRef idx="2">
+            <a:schemeClr val="accent1"/>
+          </a:effectRef>
+          <a:fontRef idx="minor">
+            <a:schemeClr val="lt1"/>
+          </a:fontRef>
+        </p:style>
+        <p:txBody>
+          <a:bodyPr rtlCol="0" anchor="ctr"/>
+          <a:lstStyle/>
+          <a:p>
+            <a:pPr algn="ctr"/>
+            <a:r>
+              <a:rPr lang="en-US" dirty="0" smtClean="0"/>
+              <a:t>Message</a:t>
+            </a:r>
+            <a:endParaRPr lang="en-US" dirty="0"/>
+          </a:p>
+        </p:txBody>
+      </p:sp>
+      <p:sp>
+        <p:nvSpPr>
+          <p:cNvPr id="13" name="Rectangle 12"/>
+          <p:cNvSpPr/>
+          <p:nvPr/>
+        </p:nvSpPr>
+        <p:spPr>
+          <a:xfrm>
+            <a:off x="6455690" y="1548772"/>
+            <a:ext cx="1371104" cy="582503"/>
+          </a:xfrm>
+          <a:prstGeom prst="rect">
+            <a:avLst/>
+          </a:prstGeom>
+        </p:spPr>
+        <p:style>
+          <a:lnRef idx="1">
+            <a:schemeClr val="accent1"/>
+          </a:lnRef>
+          <a:fillRef idx="3">
+            <a:schemeClr val="accent1"/>
+          </a:fillRef>
+          <a:effectRef idx="2">
+            <a:schemeClr val="accent1"/>
+          </a:effectRef>
+          <a:fontRef idx="minor">
+            <a:schemeClr val="lt1"/>
+          </a:fontRef>
+        </p:style>
+        <p:txBody>
+          <a:bodyPr rtlCol="0" anchor="ctr"/>
+          <a:lstStyle/>
+          <a:p>
+            <a:pPr algn="ctr"/>
+            <a:r>
+              <a:rPr lang="en-US" dirty="0" smtClean="0"/>
+              <a:t>Topic</a:t>
+            </a:r>
+            <a:endParaRPr lang="en-US" dirty="0"/>
+          </a:p>
+        </p:txBody>
+      </p:sp>
+      <p:sp>
+        <p:nvSpPr>
+          <p:cNvPr id="14" name="Rectangle 13"/>
+          <p:cNvSpPr/>
+          <p:nvPr/>
+        </p:nvSpPr>
+        <p:spPr>
+          <a:xfrm>
+            <a:off x="108245" y="3344301"/>
+            <a:ext cx="1371104" cy="582503"/>
+          </a:xfrm>
+          <a:prstGeom prst="rect">
+            <a:avLst/>
+          </a:prstGeom>
+        </p:spPr>
+        <p:style>
+          <a:lnRef idx="1">
+            <a:schemeClr val="accent1"/>
+          </a:lnRef>
+          <a:fillRef idx="3">
+            <a:schemeClr val="accent1"/>
+          </a:fillRef>
+          <a:effectRef idx="2">
+            <a:schemeClr val="accent1"/>
+          </a:effectRef>
+          <a:fontRef idx="minor">
+            <a:schemeClr val="lt1"/>
+          </a:fontRef>
+        </p:style>
+        <p:txBody>
+          <a:bodyPr rtlCol="0" anchor="ctr"/>
+          <a:lstStyle/>
+          <a:p>
+            <a:pPr algn="ctr"/>
+            <a:r>
+              <a:rPr lang="en-US" dirty="0" smtClean="0"/>
+              <a:t>Service</a:t>
+            </a:r>
+            <a:endParaRPr lang="en-US" dirty="0"/>
+          </a:p>
+        </p:txBody>
+      </p:sp>
+      <p:sp>
+        <p:nvSpPr>
+          <p:cNvPr id="15" name="Rectangle 14"/>
+          <p:cNvSpPr/>
+          <p:nvPr/>
+        </p:nvSpPr>
+        <p:spPr>
+          <a:xfrm>
+            <a:off x="1637252" y="5052528"/>
+            <a:ext cx="1675904" cy="582503"/>
+          </a:xfrm>
+          <a:prstGeom prst="rect">
+            <a:avLst/>
+          </a:prstGeom>
+        </p:spPr>
+        <p:style>
+          <a:lnRef idx="1">
+            <a:schemeClr val="accent1"/>
+          </a:lnRef>
+          <a:fillRef idx="3">
+            <a:schemeClr val="accent1"/>
+          </a:fillRef>
+          <a:effectRef idx="2">
+            <a:schemeClr val="accent1"/>
+          </a:effectRef>
+          <a:fontRef idx="minor">
+            <a:schemeClr val="lt1"/>
+          </a:fontRef>
+        </p:style>
+        <p:txBody>
+          <a:bodyPr rtlCol="0" anchor="ctr"/>
+          <a:lstStyle/>
+          <a:p>
+            <a:pPr algn="ctr"/>
+            <a:r>
+              <a:rPr lang="en-US" dirty="0" err="1" smtClean="0"/>
+              <a:t>SrvMsgRequest</a:t>
+            </a:r>
+            <a:endParaRPr lang="en-US" dirty="0"/>
+          </a:p>
+        </p:txBody>
+      </p:sp>
+      <p:sp>
+        <p:nvSpPr>
+          <p:cNvPr id="16" name="Rectangle 15"/>
+          <p:cNvSpPr/>
+          <p:nvPr/>
+        </p:nvSpPr>
+        <p:spPr>
+          <a:xfrm>
+            <a:off x="3840805" y="5052528"/>
+            <a:ext cx="2078305" cy="582503"/>
+          </a:xfrm>
+          <a:prstGeom prst="rect">
+            <a:avLst/>
+          </a:prstGeom>
+        </p:spPr>
+        <p:style>
+          <a:lnRef idx="1">
+            <a:schemeClr val="accent1"/>
+          </a:lnRef>
+          <a:fillRef idx="3">
+            <a:schemeClr val="accent1"/>
+          </a:fillRef>
+          <a:effectRef idx="2">
+            <a:schemeClr val="accent1"/>
+          </a:effectRef>
+          <a:fontRef idx="minor">
+            <a:schemeClr val="lt1"/>
+          </a:fontRef>
+        </p:style>
+        <p:txBody>
+          <a:bodyPr rtlCol="0" anchor="ctr"/>
+          <a:lstStyle/>
+          <a:p>
+            <a:pPr algn="ctr"/>
+            <a:r>
+              <a:rPr lang="en-US" dirty="0" err="1" smtClean="0"/>
+              <a:t>SrvMsgResponse</a:t>
+            </a:r>
+            <a:endParaRPr lang="en-US" dirty="0"/>
+          </a:p>
+        </p:txBody>
+      </p:sp>
+      <p:sp>
+        <p:nvSpPr>
+          <p:cNvPr id="17" name="Rectangle 16"/>
+          <p:cNvSpPr/>
+          <p:nvPr/>
+        </p:nvSpPr>
+        <p:spPr>
+          <a:xfrm>
+            <a:off x="389682" y="6091349"/>
+            <a:ext cx="2078305" cy="582503"/>
+          </a:xfrm>
+          <a:prstGeom prst="rect">
+            <a:avLst/>
+          </a:prstGeom>
+        </p:spPr>
+        <p:style>
+          <a:lnRef idx="1">
+            <a:schemeClr val="accent1"/>
+          </a:lnRef>
+          <a:fillRef idx="3">
+            <a:schemeClr val="accent1"/>
+          </a:fillRef>
+          <a:effectRef idx="2">
+            <a:schemeClr val="accent1"/>
+          </a:effectRef>
+          <a:fontRef idx="minor">
+            <a:schemeClr val="lt1"/>
+          </a:fontRef>
+        </p:style>
+        <p:txBody>
+          <a:bodyPr rtlCol="0" anchor="ctr"/>
+          <a:lstStyle/>
+          <a:p>
+            <a:pPr algn="ctr"/>
+            <a:r>
+              <a:rPr lang="en-US" dirty="0" err="1" smtClean="0"/>
+              <a:t>SrvMessage</a:t>
+            </a:r>
+            <a:endParaRPr lang="en-US" dirty="0"/>
+          </a:p>
+        </p:txBody>
+      </p:sp>
+      <p:cxnSp>
+        <p:nvCxnSpPr>
+          <p:cNvPr id="19" name="Straight Arrow Connector 18"/>
+          <p:cNvCxnSpPr>
+            <a:stCxn id="4" idx="3"/>
+            <a:endCxn id="13" idx="1"/>
+          </p:cNvCxnSpPr>
+          <p:nvPr/>
+        </p:nvCxnSpPr>
+        <p:spPr>
+          <a:xfrm>
+            <a:off x="1874751" y="1694620"/>
+            <a:ext cx="4580939" cy="145404"/>
+          </a:xfrm>
+          <a:prstGeom prst="straightConnector1">
+            <a:avLst/>
+          </a:prstGeom>
+          <a:ln>
+            <a:tailEnd type="arrow"/>
+          </a:ln>
+        </p:spPr>
+        <p:style>
+          <a:lnRef idx="2">
+            <a:schemeClr val="accent1"/>
+          </a:lnRef>
+          <a:fillRef idx="0">
+            <a:schemeClr val="accent1"/>
+          </a:fillRef>
+          <a:effectRef idx="1">
+            <a:schemeClr val="accent1"/>
+          </a:effectRef>
+          <a:fontRef idx="minor">
+            <a:schemeClr val="tx1"/>
+          </a:fontRef>
+        </p:style>
+      </p:cxnSp>
+      <p:cxnSp>
+        <p:nvCxnSpPr>
+          <p:cNvPr id="22" name="Straight Arrow Connector 21"/>
+          <p:cNvCxnSpPr>
+            <a:stCxn id="4" idx="2"/>
+            <a:endCxn id="7" idx="1"/>
+          </p:cNvCxnSpPr>
+          <p:nvPr/>
+        </p:nvCxnSpPr>
+        <p:spPr>
+          <a:xfrm>
+            <a:off x="1189199" y="1985871"/>
+            <a:ext cx="2799970" cy="795969"/>
+          </a:xfrm>
+          <a:prstGeom prst="straightConnector1">
+            <a:avLst/>
+          </a:prstGeom>
+          <a:ln>
+            <a:tailEnd type="arrow"/>
+          </a:ln>
+        </p:spPr>
+        <p:style>
+          <a:lnRef idx="2">
+            <a:schemeClr val="accent1"/>
+          </a:lnRef>
+          <a:fillRef idx="0">
+            <a:schemeClr val="accent1"/>
+          </a:fillRef>
+          <a:effectRef idx="1">
+            <a:schemeClr val="accent1"/>
+          </a:effectRef>
+          <a:fontRef idx="minor">
+            <a:schemeClr val="tx1"/>
+          </a:fontRef>
+        </p:style>
+      </p:cxnSp>
+      <p:cxnSp>
+        <p:nvCxnSpPr>
+          <p:cNvPr id="25" name="Straight Arrow Connector 24"/>
+          <p:cNvCxnSpPr>
+            <a:stCxn id="4" idx="2"/>
+            <a:endCxn id="14" idx="0"/>
+          </p:cNvCxnSpPr>
+          <p:nvPr/>
+        </p:nvCxnSpPr>
+        <p:spPr>
+          <a:xfrm flipH="1">
+            <a:off x="793797" y="1985871"/>
+            <a:ext cx="395402" cy="1358430"/>
+          </a:xfrm>
+          <a:prstGeom prst="straightConnector1">
+            <a:avLst/>
+          </a:prstGeom>
+          <a:ln>
+            <a:tailEnd type="arrow"/>
+          </a:ln>
+        </p:spPr>
+        <p:style>
+          <a:lnRef idx="2">
+            <a:schemeClr val="accent1"/>
+          </a:lnRef>
+          <a:fillRef idx="0">
+            <a:schemeClr val="accent1"/>
+          </a:fillRef>
+          <a:effectRef idx="1">
+            <a:schemeClr val="accent1"/>
+          </a:effectRef>
+          <a:fontRef idx="minor">
+            <a:schemeClr val="tx1"/>
+          </a:fontRef>
+        </p:style>
+      </p:cxnSp>
+      <p:cxnSp>
+        <p:nvCxnSpPr>
+          <p:cNvPr id="28" name="Straight Arrow Connector 27"/>
+          <p:cNvCxnSpPr>
+            <a:stCxn id="8" idx="0"/>
+            <a:endCxn id="7" idx="2"/>
+          </p:cNvCxnSpPr>
+          <p:nvPr/>
+        </p:nvCxnSpPr>
+        <p:spPr>
+          <a:xfrm flipV="1">
+            <a:off x="3089449" y="3073091"/>
+            <a:ext cx="1790509" cy="702193"/>
+          </a:xfrm>
+          <a:prstGeom prst="straightConnector1">
+            <a:avLst/>
+          </a:prstGeom>
+          <a:ln>
+            <a:tailEnd type="arrow"/>
+          </a:ln>
+        </p:spPr>
+        <p:style>
+          <a:lnRef idx="2">
+            <a:schemeClr val="accent1"/>
+          </a:lnRef>
+          <a:fillRef idx="0">
+            <a:schemeClr val="accent1"/>
+          </a:fillRef>
+          <a:effectRef idx="1">
+            <a:schemeClr val="accent1"/>
+          </a:effectRef>
+          <a:fontRef idx="minor">
+            <a:schemeClr val="tx1"/>
+          </a:fontRef>
+        </p:style>
+      </p:cxnSp>
+      <p:cxnSp>
+        <p:nvCxnSpPr>
+          <p:cNvPr id="31" name="Straight Arrow Connector 30"/>
+          <p:cNvCxnSpPr>
+            <a:stCxn id="9" idx="0"/>
+            <a:endCxn id="7" idx="2"/>
+          </p:cNvCxnSpPr>
+          <p:nvPr/>
+        </p:nvCxnSpPr>
+        <p:spPr>
+          <a:xfrm flipH="1" flipV="1">
+            <a:off x="4879958" y="3073091"/>
+            <a:ext cx="75342" cy="715949"/>
+          </a:xfrm>
+          <a:prstGeom prst="straightConnector1">
+            <a:avLst/>
+          </a:prstGeom>
+          <a:ln>
+            <a:tailEnd type="arrow"/>
+          </a:ln>
+        </p:spPr>
+        <p:style>
+          <a:lnRef idx="2">
+            <a:schemeClr val="accent1"/>
+          </a:lnRef>
+          <a:fillRef idx="0">
+            <a:schemeClr val="accent1"/>
+          </a:fillRef>
+          <a:effectRef idx="1">
+            <a:schemeClr val="accent1"/>
+          </a:effectRef>
+          <a:fontRef idx="minor">
+            <a:schemeClr val="tx1"/>
+          </a:fontRef>
+        </p:style>
+      </p:cxnSp>
+      <p:cxnSp>
+        <p:nvCxnSpPr>
+          <p:cNvPr id="34" name="Straight Arrow Connector 33"/>
+          <p:cNvCxnSpPr>
+            <a:stCxn id="11" idx="1"/>
+            <a:endCxn id="7" idx="3"/>
+          </p:cNvCxnSpPr>
+          <p:nvPr/>
+        </p:nvCxnSpPr>
+        <p:spPr>
+          <a:xfrm flipH="1" flipV="1">
+            <a:off x="5770747" y="2781840"/>
+            <a:ext cx="1542830" cy="562461"/>
+          </a:xfrm>
+          <a:prstGeom prst="straightConnector1">
+            <a:avLst/>
+          </a:prstGeom>
+          <a:ln>
+            <a:tailEnd type="arrow"/>
+          </a:ln>
+        </p:spPr>
+        <p:style>
+          <a:lnRef idx="2">
+            <a:schemeClr val="accent1"/>
+          </a:lnRef>
+          <a:fillRef idx="0">
+            <a:schemeClr val="accent1"/>
+          </a:fillRef>
+          <a:effectRef idx="1">
+            <a:schemeClr val="accent1"/>
+          </a:effectRef>
+          <a:fontRef idx="minor">
+            <a:schemeClr val="tx1"/>
+          </a:fontRef>
+        </p:style>
+      </p:cxnSp>
+      <p:cxnSp>
+        <p:nvCxnSpPr>
+          <p:cNvPr id="37" name="Straight Arrow Connector 36"/>
+          <p:cNvCxnSpPr>
+            <a:stCxn id="10" idx="1"/>
+            <a:endCxn id="7" idx="3"/>
+          </p:cNvCxnSpPr>
+          <p:nvPr/>
+        </p:nvCxnSpPr>
+        <p:spPr>
+          <a:xfrm flipH="1" flipV="1">
+            <a:off x="5770747" y="2781840"/>
+            <a:ext cx="1370495" cy="1719530"/>
+          </a:xfrm>
+          <a:prstGeom prst="straightConnector1">
+            <a:avLst/>
+          </a:prstGeom>
+          <a:ln>
+            <a:tailEnd type="arrow"/>
+          </a:ln>
+        </p:spPr>
+        <p:style>
+          <a:lnRef idx="2">
+            <a:schemeClr val="accent1"/>
+          </a:lnRef>
+          <a:fillRef idx="0">
+            <a:schemeClr val="accent1"/>
+          </a:fillRef>
+          <a:effectRef idx="1">
+            <a:schemeClr val="accent1"/>
+          </a:effectRef>
+          <a:fontRef idx="minor">
+            <a:schemeClr val="tx1"/>
+          </a:fontRef>
+        </p:style>
+      </p:cxnSp>
+      <p:cxnSp>
+        <p:nvCxnSpPr>
+          <p:cNvPr id="40" name="Straight Arrow Connector 39"/>
+          <p:cNvCxnSpPr>
+            <a:stCxn id="12" idx="0"/>
+            <a:endCxn id="13" idx="3"/>
+          </p:cNvCxnSpPr>
+          <p:nvPr/>
+        </p:nvCxnSpPr>
+        <p:spPr>
+          <a:xfrm flipH="1" flipV="1">
+            <a:off x="7826794" y="1840024"/>
+            <a:ext cx="3275238" cy="3049676"/>
+          </a:xfrm>
+          <a:prstGeom prst="straightConnector1">
+            <a:avLst/>
+          </a:prstGeom>
+          <a:ln>
+            <a:tailEnd type="arrow"/>
+          </a:ln>
+        </p:spPr>
+        <p:style>
+          <a:lnRef idx="2">
+            <a:schemeClr val="accent1"/>
+          </a:lnRef>
+          <a:fillRef idx="0">
+            <a:schemeClr val="accent1"/>
+          </a:fillRef>
+          <a:effectRef idx="1">
+            <a:schemeClr val="accent1"/>
+          </a:effectRef>
+          <a:fontRef idx="minor">
+            <a:schemeClr val="tx1"/>
+          </a:fontRef>
+        </p:style>
+      </p:cxnSp>
+      <p:cxnSp>
+        <p:nvCxnSpPr>
+          <p:cNvPr id="43" name="Straight Arrow Connector 42"/>
+          <p:cNvCxnSpPr>
+            <a:stCxn id="8" idx="2"/>
+            <a:endCxn id="15" idx="0"/>
+          </p:cNvCxnSpPr>
+          <p:nvPr/>
+        </p:nvCxnSpPr>
+        <p:spPr>
+          <a:xfrm flipH="1">
+            <a:off x="2475204" y="4357787"/>
+            <a:ext cx="614245" cy="694741"/>
+          </a:xfrm>
+          <a:prstGeom prst="straightConnector1">
+            <a:avLst/>
+          </a:prstGeom>
+          <a:ln>
+            <a:tailEnd type="arrow"/>
+          </a:ln>
+        </p:spPr>
+        <p:style>
+          <a:lnRef idx="2">
+            <a:schemeClr val="accent1"/>
+          </a:lnRef>
+          <a:fillRef idx="0">
+            <a:schemeClr val="accent1"/>
+          </a:fillRef>
+          <a:effectRef idx="1">
+            <a:schemeClr val="accent1"/>
+          </a:effectRef>
+          <a:fontRef idx="minor">
+            <a:schemeClr val="tx1"/>
+          </a:fontRef>
+        </p:style>
+      </p:cxnSp>
+      <p:cxnSp>
+        <p:nvCxnSpPr>
+          <p:cNvPr id="46" name="Straight Arrow Connector 45"/>
+          <p:cNvCxnSpPr>
+            <a:stCxn id="9" idx="2"/>
+            <a:endCxn id="16" idx="0"/>
+          </p:cNvCxnSpPr>
+          <p:nvPr/>
+        </p:nvCxnSpPr>
+        <p:spPr>
+          <a:xfrm flipH="1">
+            <a:off x="4879958" y="4371543"/>
+            <a:ext cx="75342" cy="680985"/>
+          </a:xfrm>
+          <a:prstGeom prst="straightConnector1">
+            <a:avLst/>
+          </a:prstGeom>
+          <a:ln>
+            <a:tailEnd type="arrow"/>
+          </a:ln>
+        </p:spPr>
+        <p:style>
+          <a:lnRef idx="2">
+            <a:schemeClr val="accent1"/>
+          </a:lnRef>
+          <a:fillRef idx="0">
+            <a:schemeClr val="accent1"/>
+          </a:fillRef>
+          <a:effectRef idx="1">
+            <a:schemeClr val="accent1"/>
+          </a:effectRef>
+          <a:fontRef idx="minor">
+            <a:schemeClr val="tx1"/>
+          </a:fontRef>
+        </p:style>
+      </p:cxnSp>
+      <p:cxnSp>
+        <p:nvCxnSpPr>
+          <p:cNvPr id="61" name="Straight Arrow Connector 60"/>
+          <p:cNvCxnSpPr>
+            <a:stCxn id="17" idx="0"/>
+            <a:endCxn id="14" idx="2"/>
+          </p:cNvCxnSpPr>
+          <p:nvPr/>
+        </p:nvCxnSpPr>
+        <p:spPr>
+          <a:xfrm flipH="1" flipV="1">
+            <a:off x="793797" y="3926804"/>
+            <a:ext cx="635038" cy="2164545"/>
+          </a:xfrm>
+          <a:prstGeom prst="straightConnector1">
+            <a:avLst/>
+          </a:prstGeom>
+          <a:ln>
+            <a:tailEnd type="arrow"/>
+          </a:ln>
+        </p:spPr>
+        <p:style>
+          <a:lnRef idx="2">
+            <a:schemeClr val="accent1"/>
+          </a:lnRef>
+          <a:fillRef idx="0">
+            <a:schemeClr val="accent1"/>
+          </a:fillRef>
+          <a:effectRef idx="1">
+            <a:schemeClr val="accent1"/>
+          </a:effectRef>
+          <a:fontRef idx="minor">
+            <a:schemeClr val="tx1"/>
+          </a:fontRef>
+        </p:style>
+      </p:cxnSp>
+      <p:cxnSp>
+        <p:nvCxnSpPr>
+          <p:cNvPr id="64" name="Straight Arrow Connector 63"/>
+          <p:cNvCxnSpPr>
+            <a:stCxn id="11" idx="2"/>
+            <a:endCxn id="12" idx="1"/>
+          </p:cNvCxnSpPr>
+          <p:nvPr/>
+        </p:nvCxnSpPr>
+        <p:spPr>
+          <a:xfrm>
+            <a:off x="7999129" y="3635552"/>
+            <a:ext cx="2417351" cy="1545400"/>
+          </a:xfrm>
+          <a:prstGeom prst="straightConnector1">
+            <a:avLst/>
+          </a:prstGeom>
+          <a:ln>
+            <a:tailEnd type="arrow"/>
+          </a:ln>
+        </p:spPr>
+        <p:style>
+          <a:lnRef idx="2">
+            <a:schemeClr val="accent1"/>
+          </a:lnRef>
+          <a:fillRef idx="0">
+            <a:schemeClr val="accent1"/>
+          </a:fillRef>
+          <a:effectRef idx="1">
+            <a:schemeClr val="accent1"/>
+          </a:effectRef>
+          <a:fontRef idx="minor">
+            <a:schemeClr val="tx1"/>
+          </a:fontRef>
+        </p:style>
+      </p:cxnSp>
+      <p:cxnSp>
+        <p:nvCxnSpPr>
+          <p:cNvPr id="67" name="Straight Arrow Connector 66"/>
+          <p:cNvCxnSpPr>
+            <a:stCxn id="10" idx="3"/>
+            <a:endCxn id="12" idx="1"/>
+          </p:cNvCxnSpPr>
+          <p:nvPr/>
+        </p:nvCxnSpPr>
+        <p:spPr>
+          <a:xfrm>
+            <a:off x="8512346" y="4501370"/>
+            <a:ext cx="1904134" cy="679582"/>
+          </a:xfrm>
+          <a:prstGeom prst="straightConnector1">
+            <a:avLst/>
+          </a:prstGeom>
+          <a:ln>
+            <a:tailEnd type="arrow"/>
+          </a:ln>
+        </p:spPr>
+        <p:style>
+          <a:lnRef idx="2">
+            <a:schemeClr val="accent1"/>
+          </a:lnRef>
+          <a:fillRef idx="0">
+            <a:schemeClr val="accent1"/>
+          </a:fillRef>
+          <a:effectRef idx="1">
+            <a:schemeClr val="accent1"/>
+          </a:effectRef>
+          <a:fontRef idx="minor">
+            <a:schemeClr val="tx1"/>
+          </a:fontRef>
+        </p:style>
+      </p:cxnSp>
+      <p:cxnSp>
+        <p:nvCxnSpPr>
+          <p:cNvPr id="73" name="Straight Arrow Connector 72"/>
+          <p:cNvCxnSpPr>
+            <a:stCxn id="15" idx="2"/>
+            <a:endCxn id="17" idx="0"/>
+          </p:cNvCxnSpPr>
+          <p:nvPr/>
+        </p:nvCxnSpPr>
+        <p:spPr>
+          <a:xfrm flipH="1">
+            <a:off x="1428835" y="5635031"/>
+            <a:ext cx="1046369" cy="456318"/>
+          </a:xfrm>
+          <a:prstGeom prst="straightConnector1">
+            <a:avLst/>
+          </a:prstGeom>
+          <a:ln>
+            <a:tailEnd type="arrow"/>
+          </a:ln>
+        </p:spPr>
+        <p:style>
+          <a:lnRef idx="2">
+            <a:schemeClr val="accent1"/>
+          </a:lnRef>
+          <a:fillRef idx="0">
+            <a:schemeClr val="accent1"/>
+          </a:fillRef>
+          <a:effectRef idx="1">
+            <a:schemeClr val="accent1"/>
+          </a:effectRef>
+          <a:fontRef idx="minor">
+            <a:schemeClr val="tx1"/>
+          </a:fontRef>
+        </p:style>
+      </p:cxnSp>
+      <p:cxnSp>
+        <p:nvCxnSpPr>
+          <p:cNvPr id="76" name="Straight Arrow Connector 75"/>
+          <p:cNvCxnSpPr>
+            <a:stCxn id="16" idx="2"/>
+            <a:endCxn id="17" idx="3"/>
+          </p:cNvCxnSpPr>
+          <p:nvPr/>
+        </p:nvCxnSpPr>
+        <p:spPr>
+          <a:xfrm flipH="1">
+            <a:off x="2467987" y="5635031"/>
+            <a:ext cx="2411971" cy="747570"/>
+          </a:xfrm>
+          <a:prstGeom prst="straightConnector1">
+            <a:avLst/>
+          </a:prstGeom>
+          <a:ln>
+            <a:tailEnd type="arrow"/>
+          </a:ln>
+        </p:spPr>
+        <p:style>
+          <a:lnRef idx="2">
+            <a:schemeClr val="accent1"/>
+          </a:lnRef>
+          <a:fillRef idx="0">
+            <a:schemeClr val="accent1"/>
+          </a:fillRef>
+          <a:effectRef idx="1">
+            <a:schemeClr val="accent1"/>
+          </a:effectRef>
+          <a:fontRef idx="minor">
+            <a:schemeClr val="tx1"/>
+          </a:fontRef>
+        </p:style>
+      </p:cxnSp>
+      <p:sp>
+        <p:nvSpPr>
+          <p:cNvPr id="79" name="TextBox 78"/>
+          <p:cNvSpPr txBox="1"/>
+          <p:nvPr/>
+        </p:nvSpPr>
+        <p:spPr>
+          <a:xfrm>
+            <a:off x="3667613" y="1489852"/>
+            <a:ext cx="2375094" cy="369332"/>
+          </a:xfrm>
+          <a:prstGeom prst="rect">
+            <a:avLst/>
+          </a:prstGeom>
+          <a:noFill/>
+        </p:spPr>
+        <p:txBody>
+          <a:bodyPr wrap="none" rtlCol="0">
+            <a:spAutoFit/>
+          </a:bodyPr>
+          <a:lstStyle/>
+          <a:p>
+            <a:r>
+              <a:rPr lang="en-US" dirty="0" smtClean="0"/>
+              <a:t>publishes/</a:t>
+            </a:r>
+            <a:r>
+              <a:rPr lang="en-US" dirty="0" err="1" smtClean="0"/>
+              <a:t>subscribesTo</a:t>
+            </a:r>
+            <a:endParaRPr lang="en-US" dirty="0"/>
+          </a:p>
+        </p:txBody>
+      </p:sp>
+      <p:sp>
+        <p:nvSpPr>
+          <p:cNvPr id="80" name="TextBox 79"/>
+          <p:cNvSpPr txBox="1"/>
+          <p:nvPr/>
+        </p:nvSpPr>
+        <p:spPr>
+          <a:xfrm>
+            <a:off x="1637252" y="2121256"/>
+            <a:ext cx="2346128" cy="369332"/>
+          </a:xfrm>
+          <a:prstGeom prst="rect">
+            <a:avLst/>
+          </a:prstGeom>
+          <a:noFill/>
+        </p:spPr>
+        <p:txBody>
+          <a:bodyPr wrap="none" rtlCol="0">
+            <a:spAutoFit/>
+          </a:bodyPr>
+          <a:lstStyle/>
+          <a:p>
+            <a:r>
+              <a:rPr lang="en-US" dirty="0" err="1" smtClean="0"/>
+              <a:t>communicatesThrough</a:t>
+            </a:r>
+            <a:endParaRPr lang="en-US" dirty="0"/>
+          </a:p>
+        </p:txBody>
+      </p:sp>
+      <p:sp>
+        <p:nvSpPr>
+          <p:cNvPr id="89" name="TextBox 88"/>
+          <p:cNvSpPr txBox="1"/>
+          <p:nvPr/>
+        </p:nvSpPr>
+        <p:spPr>
+          <a:xfrm>
+            <a:off x="108245" y="2597174"/>
+            <a:ext cx="1626467" cy="369332"/>
+          </a:xfrm>
+          <a:prstGeom prst="rect">
+            <a:avLst/>
+          </a:prstGeom>
+          <a:noFill/>
+        </p:spPr>
+        <p:txBody>
+          <a:bodyPr wrap="none" rtlCol="0">
+            <a:spAutoFit/>
+          </a:bodyPr>
+          <a:lstStyle/>
+          <a:p>
+            <a:r>
+              <a:rPr lang="en-US" dirty="0" smtClean="0"/>
+              <a:t>offers/requests</a:t>
+            </a:r>
+            <a:endParaRPr lang="en-US" dirty="0"/>
+          </a:p>
+        </p:txBody>
+      </p:sp>
+      <p:sp>
+        <p:nvSpPr>
+          <p:cNvPr id="90" name="TextBox 89"/>
+          <p:cNvSpPr txBox="1"/>
+          <p:nvPr/>
+        </p:nvSpPr>
+        <p:spPr>
+          <a:xfrm>
+            <a:off x="3575720" y="3131676"/>
+            <a:ext cx="461485" cy="369332"/>
+          </a:xfrm>
+          <a:prstGeom prst="rect">
+            <a:avLst/>
+          </a:prstGeom>
+          <a:noFill/>
+        </p:spPr>
+        <p:txBody>
+          <a:bodyPr wrap="none" rtlCol="0">
+            <a:spAutoFit/>
+          </a:bodyPr>
+          <a:lstStyle/>
+          <a:p>
+            <a:r>
+              <a:rPr lang="en-US" dirty="0" err="1" smtClean="0"/>
+              <a:t>isA</a:t>
+            </a:r>
+            <a:endParaRPr lang="en-US" dirty="0"/>
+          </a:p>
+        </p:txBody>
+      </p:sp>
+      <p:sp>
+        <p:nvSpPr>
+          <p:cNvPr id="91" name="TextBox 90"/>
+          <p:cNvSpPr txBox="1"/>
+          <p:nvPr/>
+        </p:nvSpPr>
+        <p:spPr>
+          <a:xfrm>
+            <a:off x="4879958" y="3284984"/>
+            <a:ext cx="461485" cy="369332"/>
+          </a:xfrm>
+          <a:prstGeom prst="rect">
+            <a:avLst/>
+          </a:prstGeom>
+          <a:noFill/>
+        </p:spPr>
+        <p:txBody>
+          <a:bodyPr wrap="none" rtlCol="0">
+            <a:spAutoFit/>
+          </a:bodyPr>
+          <a:lstStyle/>
+          <a:p>
+            <a:r>
+              <a:rPr lang="en-US" dirty="0" err="1" smtClean="0"/>
+              <a:t>isA</a:t>
+            </a:r>
+            <a:endParaRPr lang="en-US" dirty="0"/>
+          </a:p>
+        </p:txBody>
+      </p:sp>
+      <p:sp>
+        <p:nvSpPr>
+          <p:cNvPr id="92" name="TextBox 91"/>
+          <p:cNvSpPr txBox="1"/>
+          <p:nvPr/>
+        </p:nvSpPr>
+        <p:spPr>
+          <a:xfrm>
+            <a:off x="6224947" y="3734201"/>
+            <a:ext cx="461485" cy="369332"/>
+          </a:xfrm>
+          <a:prstGeom prst="rect">
+            <a:avLst/>
+          </a:prstGeom>
+          <a:noFill/>
+        </p:spPr>
+        <p:txBody>
+          <a:bodyPr wrap="none" rtlCol="0">
+            <a:spAutoFit/>
+          </a:bodyPr>
+          <a:lstStyle/>
+          <a:p>
+            <a:r>
+              <a:rPr lang="en-US" dirty="0" err="1" smtClean="0"/>
+              <a:t>isA</a:t>
+            </a:r>
+            <a:endParaRPr lang="en-US" dirty="0"/>
+          </a:p>
+        </p:txBody>
+      </p:sp>
+      <p:sp>
+        <p:nvSpPr>
+          <p:cNvPr id="93" name="TextBox 92"/>
+          <p:cNvSpPr txBox="1"/>
+          <p:nvPr/>
+        </p:nvSpPr>
+        <p:spPr>
+          <a:xfrm>
+            <a:off x="6455689" y="2712015"/>
+            <a:ext cx="461485" cy="369332"/>
+          </a:xfrm>
+          <a:prstGeom prst="rect">
+            <a:avLst/>
+          </a:prstGeom>
+          <a:noFill/>
+        </p:spPr>
+        <p:txBody>
+          <a:bodyPr wrap="none" rtlCol="0">
+            <a:spAutoFit/>
+          </a:bodyPr>
+          <a:lstStyle/>
+          <a:p>
+            <a:r>
+              <a:rPr lang="en-US" dirty="0" err="1" smtClean="0"/>
+              <a:t>isA</a:t>
+            </a:r>
+            <a:endParaRPr lang="en-US" dirty="0"/>
+          </a:p>
+        </p:txBody>
+      </p:sp>
+      <p:sp>
+        <p:nvSpPr>
+          <p:cNvPr id="94" name="TextBox 93"/>
+          <p:cNvSpPr txBox="1"/>
+          <p:nvPr/>
+        </p:nvSpPr>
+        <p:spPr>
+          <a:xfrm>
+            <a:off x="9291839" y="3098423"/>
+            <a:ext cx="2290561" cy="369332"/>
+          </a:xfrm>
+          <a:prstGeom prst="rect">
+            <a:avLst/>
+          </a:prstGeom>
+          <a:noFill/>
+        </p:spPr>
+        <p:txBody>
+          <a:bodyPr wrap="none" rtlCol="0">
+            <a:spAutoFit/>
+          </a:bodyPr>
+          <a:lstStyle/>
+          <a:p>
+            <a:r>
+              <a:rPr lang="en-US" dirty="0" err="1" smtClean="0"/>
+              <a:t>publishedIn</a:t>
+            </a:r>
+            <a:r>
+              <a:rPr lang="en-US" dirty="0" smtClean="0"/>
+              <a:t>/</a:t>
+            </a:r>
+            <a:r>
+              <a:rPr lang="en-US" dirty="0" err="1" smtClean="0"/>
+              <a:t>readFrom</a:t>
+            </a:r>
+            <a:endParaRPr lang="en-US" dirty="0"/>
+          </a:p>
+        </p:txBody>
+      </p:sp>
+      <p:sp>
+        <p:nvSpPr>
+          <p:cNvPr id="95" name="TextBox 94"/>
+          <p:cNvSpPr txBox="1"/>
+          <p:nvPr/>
+        </p:nvSpPr>
+        <p:spPr>
+          <a:xfrm>
+            <a:off x="8773844" y="3923764"/>
+            <a:ext cx="1210588" cy="369332"/>
+          </a:xfrm>
+          <a:prstGeom prst="rect">
+            <a:avLst/>
+          </a:prstGeom>
+          <a:noFill/>
+        </p:spPr>
+        <p:txBody>
+          <a:bodyPr wrap="none" rtlCol="0">
+            <a:spAutoFit/>
+          </a:bodyPr>
+          <a:lstStyle/>
+          <a:p>
+            <a:r>
+              <a:rPr lang="en-US" dirty="0" smtClean="0"/>
+              <a:t>consumers</a:t>
+            </a:r>
+            <a:endParaRPr lang="en-US" dirty="0"/>
+          </a:p>
+        </p:txBody>
+      </p:sp>
+      <p:sp>
+        <p:nvSpPr>
+          <p:cNvPr id="96" name="TextBox 95"/>
+          <p:cNvSpPr txBox="1"/>
+          <p:nvPr/>
+        </p:nvSpPr>
+        <p:spPr>
+          <a:xfrm>
+            <a:off x="8512346" y="4867170"/>
+            <a:ext cx="1056700" cy="369332"/>
+          </a:xfrm>
+          <a:prstGeom prst="rect">
+            <a:avLst/>
+          </a:prstGeom>
+          <a:noFill/>
+        </p:spPr>
+        <p:txBody>
+          <a:bodyPr wrap="none" rtlCol="0">
+            <a:spAutoFit/>
+          </a:bodyPr>
+          <a:lstStyle/>
+          <a:p>
+            <a:r>
+              <a:rPr lang="en-US" dirty="0" smtClean="0"/>
+              <a:t>produces</a:t>
+            </a:r>
+            <a:endParaRPr lang="en-US" dirty="0"/>
+          </a:p>
+        </p:txBody>
+      </p:sp>
+      <p:sp>
+        <p:nvSpPr>
+          <p:cNvPr id="100" name="TextBox 99"/>
+          <p:cNvSpPr txBox="1"/>
+          <p:nvPr/>
+        </p:nvSpPr>
+        <p:spPr>
+          <a:xfrm>
+            <a:off x="476315" y="4420042"/>
+            <a:ext cx="869386" cy="369332"/>
+          </a:xfrm>
+          <a:prstGeom prst="rect">
+            <a:avLst/>
+          </a:prstGeom>
+          <a:noFill/>
+        </p:spPr>
+        <p:txBody>
+          <a:bodyPr wrap="none" rtlCol="0">
+            <a:spAutoFit/>
+          </a:bodyPr>
+          <a:lstStyle/>
+          <a:p>
+            <a:r>
+              <a:rPr lang="en-US" dirty="0" smtClean="0"/>
+              <a:t>defines</a:t>
+            </a:r>
+            <a:endParaRPr lang="en-US" dirty="0"/>
+          </a:p>
+        </p:txBody>
+      </p:sp>
+      <p:sp>
+        <p:nvSpPr>
+          <p:cNvPr id="101" name="TextBox 100"/>
+          <p:cNvSpPr txBox="1"/>
+          <p:nvPr/>
+        </p:nvSpPr>
+        <p:spPr>
+          <a:xfrm>
+            <a:off x="3931369" y="5906683"/>
+            <a:ext cx="800219" cy="369332"/>
+          </a:xfrm>
+          <a:prstGeom prst="rect">
+            <a:avLst/>
+          </a:prstGeom>
+          <a:noFill/>
+        </p:spPr>
+        <p:txBody>
+          <a:bodyPr wrap="none" rtlCol="0">
+            <a:spAutoFit/>
+          </a:bodyPr>
+          <a:lstStyle/>
+          <a:p>
+            <a:r>
+              <a:rPr lang="en-US" dirty="0" err="1" smtClean="0"/>
+              <a:t>partOf</a:t>
+            </a:r>
+            <a:endParaRPr lang="en-US" dirty="0"/>
+          </a:p>
+        </p:txBody>
+      </p:sp>
+      <p:sp>
+        <p:nvSpPr>
+          <p:cNvPr id="102" name="TextBox 101"/>
+          <p:cNvSpPr txBox="1"/>
+          <p:nvPr/>
+        </p:nvSpPr>
+        <p:spPr>
+          <a:xfrm>
+            <a:off x="1734712" y="5641963"/>
+            <a:ext cx="800219" cy="369332"/>
+          </a:xfrm>
+          <a:prstGeom prst="rect">
+            <a:avLst/>
+          </a:prstGeom>
+          <a:noFill/>
+        </p:spPr>
+        <p:txBody>
+          <a:bodyPr wrap="none" rtlCol="0">
+            <a:spAutoFit/>
+          </a:bodyPr>
+          <a:lstStyle/>
+          <a:p>
+            <a:r>
+              <a:rPr lang="en-US" dirty="0" err="1" smtClean="0"/>
+              <a:t>partOf</a:t>
+            </a:r>
+            <a:endParaRPr lang="en-US" dirty="0"/>
+          </a:p>
+        </p:txBody>
+      </p:sp>
+      <p:cxnSp>
+        <p:nvCxnSpPr>
+          <p:cNvPr id="103" name="Straight Arrow Connector 102"/>
+          <p:cNvCxnSpPr>
+            <a:stCxn id="8" idx="2"/>
+          </p:cNvCxnSpPr>
+          <p:nvPr/>
+        </p:nvCxnSpPr>
+        <p:spPr>
+          <a:xfrm>
+            <a:off x="3089449" y="4357787"/>
+            <a:ext cx="1422375" cy="694741"/>
+          </a:xfrm>
+          <a:prstGeom prst="straightConnector1">
+            <a:avLst/>
+          </a:prstGeom>
+          <a:ln>
+            <a:tailEnd type="arrow"/>
+          </a:ln>
+        </p:spPr>
+        <p:style>
+          <a:lnRef idx="2">
+            <a:schemeClr val="accent1"/>
+          </a:lnRef>
+          <a:fillRef idx="0">
+            <a:schemeClr val="accent1"/>
+          </a:fillRef>
+          <a:effectRef idx="1">
+            <a:schemeClr val="accent1"/>
+          </a:effectRef>
+          <a:fontRef idx="minor">
+            <a:schemeClr val="tx1"/>
+          </a:fontRef>
+        </p:style>
+      </p:cxnSp>
+      <p:cxnSp>
+        <p:nvCxnSpPr>
+          <p:cNvPr id="106" name="Straight Arrow Connector 105"/>
+          <p:cNvCxnSpPr>
+            <a:stCxn id="9" idx="2"/>
+            <a:endCxn id="15" idx="0"/>
+          </p:cNvCxnSpPr>
+          <p:nvPr/>
+        </p:nvCxnSpPr>
+        <p:spPr>
+          <a:xfrm flipH="1">
+            <a:off x="2475204" y="4371543"/>
+            <a:ext cx="2480096" cy="680985"/>
+          </a:xfrm>
+          <a:prstGeom prst="straightConnector1">
+            <a:avLst/>
+          </a:prstGeom>
+          <a:ln>
+            <a:tailEnd type="arrow"/>
+          </a:ln>
+        </p:spPr>
+        <p:style>
+          <a:lnRef idx="2">
+            <a:schemeClr val="accent1"/>
+          </a:lnRef>
+          <a:fillRef idx="0">
+            <a:schemeClr val="accent1"/>
+          </a:fillRef>
+          <a:effectRef idx="1">
+            <a:schemeClr val="accent1"/>
+          </a:effectRef>
+          <a:fontRef idx="minor">
+            <a:schemeClr val="tx1"/>
+          </a:fontRef>
+        </p:style>
+      </p:cxnSp>
+      <p:sp>
+        <p:nvSpPr>
+          <p:cNvPr id="109" name="TextBox 108"/>
+          <p:cNvSpPr txBox="1"/>
+          <p:nvPr/>
+        </p:nvSpPr>
+        <p:spPr>
+          <a:xfrm>
+            <a:off x="4932910" y="4604708"/>
+            <a:ext cx="870626" cy="369332"/>
+          </a:xfrm>
+          <a:prstGeom prst="rect">
+            <a:avLst/>
+          </a:prstGeom>
+          <a:noFill/>
+        </p:spPr>
+        <p:txBody>
+          <a:bodyPr wrap="none" rtlCol="0">
+            <a:spAutoFit/>
+          </a:bodyPr>
+          <a:lstStyle/>
+          <a:p>
+            <a:r>
+              <a:rPr lang="en-US" dirty="0" smtClean="0"/>
+              <a:t>creates</a:t>
+            </a:r>
+            <a:endParaRPr lang="en-US" dirty="0"/>
+          </a:p>
+        </p:txBody>
+      </p:sp>
+      <p:sp>
+        <p:nvSpPr>
+          <p:cNvPr id="110" name="TextBox 109"/>
+          <p:cNvSpPr txBox="1"/>
+          <p:nvPr/>
+        </p:nvSpPr>
+        <p:spPr>
+          <a:xfrm>
+            <a:off x="1860682" y="4520368"/>
+            <a:ext cx="954821" cy="369332"/>
+          </a:xfrm>
+          <a:prstGeom prst="rect">
+            <a:avLst/>
+          </a:prstGeom>
+          <a:noFill/>
+        </p:spPr>
+        <p:txBody>
+          <a:bodyPr wrap="none" rtlCol="0">
+            <a:spAutoFit/>
+          </a:bodyPr>
+          <a:lstStyle/>
+          <a:p>
+            <a:r>
+              <a:rPr lang="en-US" dirty="0" smtClean="0"/>
+              <a:t>receives</a:t>
             </a:r>
             <a:endParaRPr lang="en-US" dirty="0"/>
           </a:p>
@@ -5468,6 +7497,13 @@
   <p:clrMapOvr>
     <a:masterClrMapping/>
   </p:clrMapOvr>
+  <p:timing>
+    <p:tnLst>
+      <p:par>
+        <p:cTn xmlns:p14="http://schemas.microsoft.com/office/powerpoint/2010/main" id="1" dur="indefinite" restart="never" nodeType="tmRoot"/>
+      </p:par>
+    </p:tnLst>
+  </p:timing>
 </p:sld>
 </file>
 
@@ -5513,27 +7549,510 @@
       </p:sp>
       <p:sp>
         <p:nvSpPr>
-          <p:cNvPr id="3" name="Content Placeholder 2"/>
-          <p:cNvSpPr>
-            <a:spLocks noGrp="1"/>
-          </p:cNvSpPr>
-          <p:nvPr>
-            <p:ph idx="1"/>
-          </p:nvPr>
-        </p:nvSpPr>
-        <p:spPr/>
-        <p:txBody>
-          <a:bodyPr/>
-          <a:lstStyle/>
-          <a:p>
+          <p:cNvPr id="6" name="Rectangle 5"/>
+          <p:cNvSpPr/>
+          <p:nvPr/>
+        </p:nvSpPr>
+        <p:spPr>
+          <a:xfrm>
+            <a:off x="411331" y="3405711"/>
+            <a:ext cx="1371104" cy="582503"/>
+          </a:xfrm>
+          <a:prstGeom prst="rect">
+            <a:avLst/>
+          </a:prstGeom>
+        </p:spPr>
+        <p:style>
+          <a:lnRef idx="1">
+            <a:schemeClr val="accent1"/>
+          </a:lnRef>
+          <a:fillRef idx="3">
+            <a:schemeClr val="accent1"/>
+          </a:fillRef>
+          <a:effectRef idx="2">
+            <a:schemeClr val="accent1"/>
+          </a:effectRef>
+          <a:fontRef idx="minor">
+            <a:schemeClr val="lt1"/>
+          </a:fontRef>
+        </p:style>
+        <p:txBody>
+          <a:bodyPr rtlCol="0" anchor="ctr"/>
+          <a:lstStyle/>
+          <a:p>
+            <a:pPr algn="ctr"/>
             <a:r>
               <a:rPr lang="en-US" dirty="0" smtClean="0"/>
-              <a:t>Ontological representation of Robot Capabilities</a:t>
+              <a:t>Capability</a:t>
             </a:r>
             <a:endParaRPr lang="en-US" dirty="0"/>
           </a:p>
         </p:txBody>
       </p:sp>
+      <p:sp>
+        <p:nvSpPr>
+          <p:cNvPr id="7" name="Rectangle 6"/>
+          <p:cNvSpPr/>
+          <p:nvPr/>
+        </p:nvSpPr>
+        <p:spPr>
+          <a:xfrm>
+            <a:off x="3882389" y="2251287"/>
+            <a:ext cx="1371104" cy="582503"/>
+          </a:xfrm>
+          <a:prstGeom prst="rect">
+            <a:avLst/>
+          </a:prstGeom>
+        </p:spPr>
+        <p:style>
+          <a:lnRef idx="1">
+            <a:schemeClr val="accent1"/>
+          </a:lnRef>
+          <a:fillRef idx="3">
+            <a:schemeClr val="accent1"/>
+          </a:fillRef>
+          <a:effectRef idx="2">
+            <a:schemeClr val="accent1"/>
+          </a:effectRef>
+          <a:fontRef idx="minor">
+            <a:schemeClr val="lt1"/>
+          </a:fontRef>
+        </p:style>
+        <p:txBody>
+          <a:bodyPr rtlCol="0" anchor="ctr"/>
+          <a:lstStyle/>
+          <a:p>
+            <a:pPr algn="ctr"/>
+            <a:r>
+              <a:rPr lang="en-US" dirty="0" smtClean="0"/>
+              <a:t>Sensing</a:t>
+            </a:r>
+            <a:endParaRPr lang="en-US" dirty="0"/>
+          </a:p>
+        </p:txBody>
+      </p:sp>
+      <p:sp>
+        <p:nvSpPr>
+          <p:cNvPr id="8" name="Rectangle 7"/>
+          <p:cNvSpPr/>
+          <p:nvPr/>
+        </p:nvSpPr>
+        <p:spPr>
+          <a:xfrm>
+            <a:off x="3882389" y="3405711"/>
+            <a:ext cx="1371104" cy="582503"/>
+          </a:xfrm>
+          <a:prstGeom prst="rect">
+            <a:avLst/>
+          </a:prstGeom>
+        </p:spPr>
+        <p:style>
+          <a:lnRef idx="1">
+            <a:schemeClr val="accent1"/>
+          </a:lnRef>
+          <a:fillRef idx="3">
+            <a:schemeClr val="accent1"/>
+          </a:fillRef>
+          <a:effectRef idx="2">
+            <a:schemeClr val="accent1"/>
+          </a:effectRef>
+          <a:fontRef idx="minor">
+            <a:schemeClr val="lt1"/>
+          </a:fontRef>
+        </p:style>
+        <p:txBody>
+          <a:bodyPr rtlCol="0" anchor="ctr"/>
+          <a:lstStyle/>
+          <a:p>
+            <a:pPr algn="ctr"/>
+            <a:r>
+              <a:rPr lang="en-US" dirty="0" smtClean="0"/>
+              <a:t>Movement</a:t>
+            </a:r>
+            <a:endParaRPr lang="en-US" dirty="0"/>
+          </a:p>
+        </p:txBody>
+      </p:sp>
+      <p:sp>
+        <p:nvSpPr>
+          <p:cNvPr id="9" name="Rectangle 8"/>
+          <p:cNvSpPr/>
+          <p:nvPr/>
+        </p:nvSpPr>
+        <p:spPr>
+          <a:xfrm>
+            <a:off x="3587376" y="4597093"/>
+            <a:ext cx="1666117" cy="582503"/>
+          </a:xfrm>
+          <a:prstGeom prst="rect">
+            <a:avLst/>
+          </a:prstGeom>
+        </p:spPr>
+        <p:style>
+          <a:lnRef idx="1">
+            <a:schemeClr val="accent1"/>
+          </a:lnRef>
+          <a:fillRef idx="3">
+            <a:schemeClr val="accent1"/>
+          </a:fillRef>
+          <a:effectRef idx="2">
+            <a:schemeClr val="accent1"/>
+          </a:effectRef>
+          <a:fontRef idx="minor">
+            <a:schemeClr val="lt1"/>
+          </a:fontRef>
+        </p:style>
+        <p:txBody>
+          <a:bodyPr rtlCol="0" anchor="ctr"/>
+          <a:lstStyle/>
+          <a:p>
+            <a:pPr algn="ctr"/>
+            <a:r>
+              <a:rPr lang="en-US" dirty="0" smtClean="0"/>
+              <a:t>Representation</a:t>
+            </a:r>
+            <a:endParaRPr lang="en-US" dirty="0"/>
+          </a:p>
+        </p:txBody>
+      </p:sp>
+      <p:sp>
+        <p:nvSpPr>
+          <p:cNvPr id="10" name="Rectangle 9"/>
+          <p:cNvSpPr/>
+          <p:nvPr/>
+        </p:nvSpPr>
+        <p:spPr>
+          <a:xfrm>
+            <a:off x="3552150" y="5687463"/>
+            <a:ext cx="1666117" cy="582503"/>
+          </a:xfrm>
+          <a:prstGeom prst="rect">
+            <a:avLst/>
+          </a:prstGeom>
+        </p:spPr>
+        <p:style>
+          <a:lnRef idx="1">
+            <a:schemeClr val="accent1"/>
+          </a:lnRef>
+          <a:fillRef idx="3">
+            <a:schemeClr val="accent1"/>
+          </a:fillRef>
+          <a:effectRef idx="2">
+            <a:schemeClr val="accent1"/>
+          </a:effectRef>
+          <a:fontRef idx="minor">
+            <a:schemeClr val="lt1"/>
+          </a:fontRef>
+        </p:style>
+        <p:txBody>
+          <a:bodyPr rtlCol="0" anchor="ctr"/>
+          <a:lstStyle/>
+          <a:p>
+            <a:pPr algn="ctr"/>
+            <a:r>
+              <a:rPr lang="en-US" dirty="0" smtClean="0"/>
+              <a:t>…</a:t>
+            </a:r>
+            <a:endParaRPr lang="en-US" dirty="0"/>
+          </a:p>
+        </p:txBody>
+      </p:sp>
+      <p:sp>
+        <p:nvSpPr>
+          <p:cNvPr id="11" name="Rectangle 10"/>
+          <p:cNvSpPr/>
+          <p:nvPr/>
+        </p:nvSpPr>
+        <p:spPr>
+          <a:xfrm>
+            <a:off x="6504487" y="2988276"/>
+            <a:ext cx="1666117" cy="582503"/>
+          </a:xfrm>
+          <a:prstGeom prst="rect">
+            <a:avLst/>
+          </a:prstGeom>
+        </p:spPr>
+        <p:style>
+          <a:lnRef idx="1">
+            <a:schemeClr val="accent1"/>
+          </a:lnRef>
+          <a:fillRef idx="3">
+            <a:schemeClr val="accent1"/>
+          </a:fillRef>
+          <a:effectRef idx="2">
+            <a:schemeClr val="accent1"/>
+          </a:effectRef>
+          <a:fontRef idx="minor">
+            <a:schemeClr val="lt1"/>
+          </a:fontRef>
+        </p:style>
+        <p:txBody>
+          <a:bodyPr rtlCol="0" anchor="ctr"/>
+          <a:lstStyle/>
+          <a:p>
+            <a:pPr algn="ctr"/>
+            <a:r>
+              <a:rPr lang="en-US" dirty="0" smtClean="0"/>
+              <a:t>Body Movement</a:t>
+            </a:r>
+            <a:endParaRPr lang="en-US" dirty="0"/>
+          </a:p>
+        </p:txBody>
+      </p:sp>
+      <p:sp>
+        <p:nvSpPr>
+          <p:cNvPr id="12" name="Rectangle 11"/>
+          <p:cNvSpPr/>
+          <p:nvPr/>
+        </p:nvSpPr>
+        <p:spPr>
+          <a:xfrm>
+            <a:off x="6504487" y="4020924"/>
+            <a:ext cx="1666117" cy="582503"/>
+          </a:xfrm>
+          <a:prstGeom prst="rect">
+            <a:avLst/>
+          </a:prstGeom>
+        </p:spPr>
+        <p:style>
+          <a:lnRef idx="1">
+            <a:schemeClr val="accent1"/>
+          </a:lnRef>
+          <a:fillRef idx="3">
+            <a:schemeClr val="accent1"/>
+          </a:fillRef>
+          <a:effectRef idx="2">
+            <a:schemeClr val="accent1"/>
+          </a:effectRef>
+          <a:fontRef idx="minor">
+            <a:schemeClr val="lt1"/>
+          </a:fontRef>
+        </p:style>
+        <p:txBody>
+          <a:bodyPr rtlCol="0" anchor="ctr"/>
+          <a:lstStyle/>
+          <a:p>
+            <a:pPr algn="ctr"/>
+            <a:r>
+              <a:rPr lang="en-US" dirty="0" smtClean="0"/>
+              <a:t>Navigation</a:t>
+            </a:r>
+            <a:endParaRPr lang="en-US" dirty="0"/>
+          </a:p>
+        </p:txBody>
+      </p:sp>
+      <p:cxnSp>
+        <p:nvCxnSpPr>
+          <p:cNvPr id="13" name="Straight Arrow Connector 12"/>
+          <p:cNvCxnSpPr>
+            <a:stCxn id="7" idx="1"/>
+          </p:cNvCxnSpPr>
+          <p:nvPr/>
+        </p:nvCxnSpPr>
+        <p:spPr>
+          <a:xfrm flipH="1">
+            <a:off x="1782435" y="2542539"/>
+            <a:ext cx="2099954" cy="1028240"/>
+          </a:xfrm>
+          <a:prstGeom prst="straightConnector1">
+            <a:avLst/>
+          </a:prstGeom>
+          <a:ln>
+            <a:tailEnd type="arrow"/>
+          </a:ln>
+        </p:spPr>
+        <p:style>
+          <a:lnRef idx="2">
+            <a:schemeClr val="accent1"/>
+          </a:lnRef>
+          <a:fillRef idx="0">
+            <a:schemeClr val="accent1"/>
+          </a:fillRef>
+          <a:effectRef idx="1">
+            <a:schemeClr val="accent1"/>
+          </a:effectRef>
+          <a:fontRef idx="minor">
+            <a:schemeClr val="tx1"/>
+          </a:fontRef>
+        </p:style>
+      </p:cxnSp>
+      <p:cxnSp>
+        <p:nvCxnSpPr>
+          <p:cNvPr id="16" name="Straight Arrow Connector 15"/>
+          <p:cNvCxnSpPr>
+            <a:stCxn id="8" idx="1"/>
+            <a:endCxn id="6" idx="3"/>
+          </p:cNvCxnSpPr>
+          <p:nvPr/>
+        </p:nvCxnSpPr>
+        <p:spPr>
+          <a:xfrm flipH="1">
+            <a:off x="1782435" y="3696963"/>
+            <a:ext cx="2099954" cy="0"/>
+          </a:xfrm>
+          <a:prstGeom prst="straightConnector1">
+            <a:avLst/>
+          </a:prstGeom>
+          <a:ln>
+            <a:tailEnd type="arrow"/>
+          </a:ln>
+        </p:spPr>
+        <p:style>
+          <a:lnRef idx="2">
+            <a:schemeClr val="accent1"/>
+          </a:lnRef>
+          <a:fillRef idx="0">
+            <a:schemeClr val="accent1"/>
+          </a:fillRef>
+          <a:effectRef idx="1">
+            <a:schemeClr val="accent1"/>
+          </a:effectRef>
+          <a:fontRef idx="minor">
+            <a:schemeClr val="tx1"/>
+          </a:fontRef>
+        </p:style>
+      </p:cxnSp>
+      <p:cxnSp>
+        <p:nvCxnSpPr>
+          <p:cNvPr id="23" name="Straight Arrow Connector 22"/>
+          <p:cNvCxnSpPr>
+            <a:stCxn id="9" idx="1"/>
+          </p:cNvCxnSpPr>
+          <p:nvPr/>
+        </p:nvCxnSpPr>
+        <p:spPr>
+          <a:xfrm flipH="1" flipV="1">
+            <a:off x="1782435" y="3852890"/>
+            <a:ext cx="1804941" cy="1035455"/>
+          </a:xfrm>
+          <a:prstGeom prst="straightConnector1">
+            <a:avLst/>
+          </a:prstGeom>
+          <a:ln>
+            <a:tailEnd type="arrow"/>
+          </a:ln>
+        </p:spPr>
+        <p:style>
+          <a:lnRef idx="2">
+            <a:schemeClr val="accent1"/>
+          </a:lnRef>
+          <a:fillRef idx="0">
+            <a:schemeClr val="accent1"/>
+          </a:fillRef>
+          <a:effectRef idx="1">
+            <a:schemeClr val="accent1"/>
+          </a:effectRef>
+          <a:fontRef idx="minor">
+            <a:schemeClr val="tx1"/>
+          </a:fontRef>
+        </p:style>
+      </p:cxnSp>
+      <p:cxnSp>
+        <p:nvCxnSpPr>
+          <p:cNvPr id="27" name="Straight Arrow Connector 26"/>
+          <p:cNvCxnSpPr>
+            <a:stCxn id="10" idx="1"/>
+          </p:cNvCxnSpPr>
+          <p:nvPr/>
+        </p:nvCxnSpPr>
+        <p:spPr>
+          <a:xfrm flipH="1" flipV="1">
+            <a:off x="1630892" y="4005291"/>
+            <a:ext cx="1921258" cy="1973424"/>
+          </a:xfrm>
+          <a:prstGeom prst="straightConnector1">
+            <a:avLst/>
+          </a:prstGeom>
+          <a:ln>
+            <a:tailEnd type="arrow"/>
+          </a:ln>
+        </p:spPr>
+        <p:style>
+          <a:lnRef idx="2">
+            <a:schemeClr val="accent1"/>
+          </a:lnRef>
+          <a:fillRef idx="0">
+            <a:schemeClr val="accent1"/>
+          </a:fillRef>
+          <a:effectRef idx="1">
+            <a:schemeClr val="accent1"/>
+          </a:effectRef>
+          <a:fontRef idx="minor">
+            <a:schemeClr val="tx1"/>
+          </a:fontRef>
+        </p:style>
+      </p:cxnSp>
+      <p:cxnSp>
+        <p:nvCxnSpPr>
+          <p:cNvPr id="30" name="Straight Arrow Connector 29"/>
+          <p:cNvCxnSpPr>
+            <a:stCxn id="11" idx="1"/>
+            <a:endCxn id="8" idx="3"/>
+          </p:cNvCxnSpPr>
+          <p:nvPr/>
+        </p:nvCxnSpPr>
+        <p:spPr>
+          <a:xfrm flipH="1">
+            <a:off x="5253493" y="3279528"/>
+            <a:ext cx="1250994" cy="417435"/>
+          </a:xfrm>
+          <a:prstGeom prst="straightConnector1">
+            <a:avLst/>
+          </a:prstGeom>
+          <a:ln>
+            <a:tailEnd type="arrow"/>
+          </a:ln>
+        </p:spPr>
+        <p:style>
+          <a:lnRef idx="2">
+            <a:schemeClr val="accent1"/>
+          </a:lnRef>
+          <a:fillRef idx="0">
+            <a:schemeClr val="accent1"/>
+          </a:fillRef>
+          <a:effectRef idx="1">
+            <a:schemeClr val="accent1"/>
+          </a:effectRef>
+          <a:fontRef idx="minor">
+            <a:schemeClr val="tx1"/>
+          </a:fontRef>
+        </p:style>
+      </p:cxnSp>
+      <p:cxnSp>
+        <p:nvCxnSpPr>
+          <p:cNvPr id="33" name="Straight Arrow Connector 32"/>
+          <p:cNvCxnSpPr>
+            <a:stCxn id="12" idx="1"/>
+          </p:cNvCxnSpPr>
+          <p:nvPr/>
+        </p:nvCxnSpPr>
+        <p:spPr>
+          <a:xfrm flipH="1" flipV="1">
+            <a:off x="5253493" y="3849363"/>
+            <a:ext cx="1250994" cy="462813"/>
+          </a:xfrm>
+          <a:prstGeom prst="straightConnector1">
+            <a:avLst/>
+          </a:prstGeom>
+          <a:ln>
+            <a:tailEnd type="arrow"/>
+          </a:ln>
+        </p:spPr>
+        <p:style>
+          <a:lnRef idx="2">
+            <a:schemeClr val="accent1"/>
+          </a:lnRef>
+          <a:fillRef idx="0">
+            <a:schemeClr val="accent1"/>
+          </a:fillRef>
+          <a:effectRef idx="1">
+            <a:schemeClr val="accent1"/>
+          </a:effectRef>
+          <a:fontRef idx="minor">
+            <a:schemeClr val="tx1"/>
+          </a:fontRef>
+        </p:style>
+      </p:cxnSp>
     </p:spTree>
     <p:extLst>
       <p:ext uri="{BB962C8B-B14F-4D97-AF65-F5344CB8AC3E}">
@@ -5544,6 +8063,13 @@
   <p:clrMapOvr>
     <a:masterClrMapping/>
   </p:clrMapOvr>
+  <p:timing>
+    <p:tnLst>
+      <p:par>
+        <p:cTn xmlns:p14="http://schemas.microsoft.com/office/powerpoint/2010/main" id="1" dur="indefinite" restart="never" nodeType="tmRoot"/>
+      </p:par>
+    </p:tnLst>
+  </p:timing>
 </p:sld>
 </file>
 
@@ -5589,27 +8115,508 @@
       </p:sp>
       <p:sp>
         <p:nvSpPr>
-          <p:cNvPr id="3" name="Content Placeholder 2"/>
-          <p:cNvSpPr>
-            <a:spLocks noGrp="1"/>
-          </p:cNvSpPr>
-          <p:nvPr>
-            <p:ph idx="1"/>
-          </p:nvPr>
-        </p:nvSpPr>
-        <p:spPr/>
-        <p:txBody>
-          <a:bodyPr/>
-          <a:lstStyle/>
-          <a:p>
+          <p:cNvPr id="5" name="Rectangle 4"/>
+          <p:cNvSpPr/>
+          <p:nvPr/>
+        </p:nvSpPr>
+        <p:spPr>
+          <a:xfrm>
+            <a:off x="6718409" y="3405871"/>
+            <a:ext cx="1371104" cy="582503"/>
+          </a:xfrm>
+          <a:prstGeom prst="rect">
+            <a:avLst/>
+          </a:prstGeom>
+        </p:spPr>
+        <p:style>
+          <a:lnRef idx="1">
+            <a:schemeClr val="accent1"/>
+          </a:lnRef>
+          <a:fillRef idx="3">
+            <a:schemeClr val="accent1"/>
+          </a:fillRef>
+          <a:effectRef idx="2">
+            <a:schemeClr val="accent1"/>
+          </a:effectRef>
+          <a:fontRef idx="minor">
+            <a:schemeClr val="lt1"/>
+          </a:fontRef>
+        </p:style>
+        <p:txBody>
+          <a:bodyPr rtlCol="0" anchor="ctr"/>
+          <a:lstStyle/>
+          <a:p>
+            <a:pPr algn="ctr"/>
             <a:r>
               <a:rPr lang="en-US" dirty="0" smtClean="0"/>
-              <a:t>Link between ontology sections</a:t>
+              <a:t>Capability</a:t>
             </a:r>
             <a:endParaRPr lang="en-US" dirty="0"/>
           </a:p>
         </p:txBody>
       </p:sp>
+      <p:sp>
+        <p:nvSpPr>
+          <p:cNvPr id="6" name="Rectangle 5"/>
+          <p:cNvSpPr/>
+          <p:nvPr/>
+        </p:nvSpPr>
+        <p:spPr>
+          <a:xfrm>
+            <a:off x="1915757" y="3404987"/>
+            <a:ext cx="1371104" cy="582503"/>
+          </a:xfrm>
+          <a:prstGeom prst="rect">
+            <a:avLst/>
+          </a:prstGeom>
+        </p:spPr>
+        <p:style>
+          <a:lnRef idx="1">
+            <a:schemeClr val="accent1"/>
+          </a:lnRef>
+          <a:fillRef idx="3">
+            <a:schemeClr val="accent1"/>
+          </a:fillRef>
+          <a:effectRef idx="2">
+            <a:schemeClr val="accent1"/>
+          </a:effectRef>
+          <a:fontRef idx="minor">
+            <a:schemeClr val="lt1"/>
+          </a:fontRef>
+        </p:style>
+        <p:txBody>
+          <a:bodyPr rtlCol="0" anchor="ctr"/>
+          <a:lstStyle/>
+          <a:p>
+            <a:pPr algn="ctr"/>
+            <a:r>
+              <a:rPr lang="en-US" dirty="0" smtClean="0"/>
+              <a:t>Message</a:t>
+            </a:r>
+            <a:endParaRPr lang="en-US" dirty="0"/>
+          </a:p>
+        </p:txBody>
+      </p:sp>
+      <p:cxnSp>
+        <p:nvCxnSpPr>
+          <p:cNvPr id="8" name="Straight Arrow Connector 7"/>
+          <p:cNvCxnSpPr>
+            <a:stCxn id="6" idx="3"/>
+            <a:endCxn id="5" idx="1"/>
+          </p:cNvCxnSpPr>
+          <p:nvPr/>
+        </p:nvCxnSpPr>
+        <p:spPr>
+          <a:xfrm>
+            <a:off x="3286861" y="3696239"/>
+            <a:ext cx="3431548" cy="884"/>
+          </a:xfrm>
+          <a:prstGeom prst="straightConnector1">
+            <a:avLst/>
+          </a:prstGeom>
+          <a:ln>
+            <a:tailEnd type="arrow"/>
+          </a:ln>
+        </p:spPr>
+        <p:style>
+          <a:lnRef idx="2">
+            <a:schemeClr val="accent1"/>
+          </a:lnRef>
+          <a:fillRef idx="0">
+            <a:schemeClr val="accent1"/>
+          </a:fillRef>
+          <a:effectRef idx="1">
+            <a:schemeClr val="accent1"/>
+          </a:effectRef>
+          <a:fontRef idx="minor">
+            <a:schemeClr val="tx1"/>
+          </a:fontRef>
+        </p:style>
+      </p:cxnSp>
+      <p:cxnSp>
+        <p:nvCxnSpPr>
+          <p:cNvPr id="9" name="Straight Arrow Connector 8"/>
+          <p:cNvCxnSpPr/>
+          <p:nvPr/>
+        </p:nvCxnSpPr>
+        <p:spPr>
+          <a:xfrm flipH="1" flipV="1">
+            <a:off x="750499" y="1890369"/>
+            <a:ext cx="1356671" cy="1514618"/>
+          </a:xfrm>
+          <a:prstGeom prst="straightConnector1">
+            <a:avLst/>
+          </a:prstGeom>
+          <a:ln>
+            <a:tailEnd type="arrow"/>
+          </a:ln>
+        </p:spPr>
+        <p:style>
+          <a:lnRef idx="2">
+            <a:schemeClr val="accent1"/>
+          </a:lnRef>
+          <a:fillRef idx="0">
+            <a:schemeClr val="accent1"/>
+          </a:fillRef>
+          <a:effectRef idx="1">
+            <a:schemeClr val="accent1"/>
+          </a:effectRef>
+          <a:fontRef idx="minor">
+            <a:schemeClr val="tx1"/>
+          </a:fontRef>
+        </p:style>
+      </p:cxnSp>
+      <p:cxnSp>
+        <p:nvCxnSpPr>
+          <p:cNvPr id="13" name="Straight Arrow Connector 12"/>
+          <p:cNvCxnSpPr/>
+          <p:nvPr/>
+        </p:nvCxnSpPr>
+        <p:spPr>
+          <a:xfrm flipV="1">
+            <a:off x="8089513" y="2857199"/>
+            <a:ext cx="814799" cy="820360"/>
+          </a:xfrm>
+          <a:prstGeom prst="straightConnector1">
+            <a:avLst/>
+          </a:prstGeom>
+          <a:ln>
+            <a:tailEnd type="arrow"/>
+          </a:ln>
+        </p:spPr>
+        <p:style>
+          <a:lnRef idx="2">
+            <a:schemeClr val="accent1"/>
+          </a:lnRef>
+          <a:fillRef idx="0">
+            <a:schemeClr val="accent1"/>
+          </a:fillRef>
+          <a:effectRef idx="1">
+            <a:schemeClr val="accent1"/>
+          </a:effectRef>
+          <a:fontRef idx="minor">
+            <a:schemeClr val="tx1"/>
+          </a:fontRef>
+        </p:style>
+      </p:cxnSp>
+      <p:cxnSp>
+        <p:nvCxnSpPr>
+          <p:cNvPr id="15" name="Straight Arrow Connector 14"/>
+          <p:cNvCxnSpPr>
+            <a:stCxn id="5" idx="3"/>
+          </p:cNvCxnSpPr>
+          <p:nvPr/>
+        </p:nvCxnSpPr>
+        <p:spPr>
+          <a:xfrm>
+            <a:off x="8089513" y="3697123"/>
+            <a:ext cx="814799" cy="595973"/>
+          </a:xfrm>
+          <a:prstGeom prst="straightConnector1">
+            <a:avLst/>
+          </a:prstGeom>
+          <a:ln>
+            <a:tailEnd type="arrow"/>
+          </a:ln>
+        </p:spPr>
+        <p:style>
+          <a:lnRef idx="2">
+            <a:schemeClr val="accent1"/>
+          </a:lnRef>
+          <a:fillRef idx="0">
+            <a:schemeClr val="accent1"/>
+          </a:fillRef>
+          <a:effectRef idx="1">
+            <a:schemeClr val="accent1"/>
+          </a:effectRef>
+          <a:fontRef idx="minor">
+            <a:schemeClr val="tx1"/>
+          </a:fontRef>
+        </p:style>
+      </p:cxnSp>
+      <p:cxnSp>
+        <p:nvCxnSpPr>
+          <p:cNvPr id="18" name="Straight Arrow Connector 17"/>
+          <p:cNvCxnSpPr>
+            <a:endCxn id="6" idx="1"/>
+          </p:cNvCxnSpPr>
+          <p:nvPr/>
+        </p:nvCxnSpPr>
+        <p:spPr>
+          <a:xfrm flipV="1">
+            <a:off x="432980" y="3696239"/>
+            <a:ext cx="1482777" cy="291251"/>
+          </a:xfrm>
+          <a:prstGeom prst="straightConnector1">
+            <a:avLst/>
+          </a:prstGeom>
+          <a:ln>
+            <a:tailEnd type="arrow"/>
+          </a:ln>
+        </p:spPr>
+        <p:style>
+          <a:lnRef idx="2">
+            <a:schemeClr val="accent1"/>
+          </a:lnRef>
+          <a:fillRef idx="0">
+            <a:schemeClr val="accent1"/>
+          </a:fillRef>
+          <a:effectRef idx="1">
+            <a:schemeClr val="accent1"/>
+          </a:effectRef>
+          <a:fontRef idx="minor">
+            <a:schemeClr val="tx1"/>
+          </a:fontRef>
+        </p:style>
+      </p:cxnSp>
+      <p:cxnSp>
+        <p:nvCxnSpPr>
+          <p:cNvPr id="24" name="Straight Connector 23"/>
+          <p:cNvCxnSpPr/>
+          <p:nvPr/>
+        </p:nvCxnSpPr>
+        <p:spPr>
+          <a:xfrm>
+            <a:off x="4892676" y="1556792"/>
+            <a:ext cx="0" cy="4392488"/>
+          </a:xfrm>
+          <a:prstGeom prst="line">
+            <a:avLst/>
+          </a:prstGeom>
+          <a:ln>
+            <a:solidFill>
+              <a:schemeClr val="tx1"/>
+            </a:solidFill>
+            <a:prstDash val="dash"/>
+          </a:ln>
+        </p:spPr>
+        <p:style>
+          <a:lnRef idx="2">
+            <a:schemeClr val="accent1"/>
+          </a:lnRef>
+          <a:fillRef idx="0">
+            <a:schemeClr val="accent1"/>
+          </a:fillRef>
+          <a:effectRef idx="1">
+            <a:schemeClr val="accent1"/>
+          </a:effectRef>
+          <a:fontRef idx="minor">
+            <a:schemeClr val="tx1"/>
+          </a:fontRef>
+        </p:style>
+      </p:cxnSp>
+      <p:sp>
+        <p:nvSpPr>
+          <p:cNvPr id="32" name="Rectangle 31"/>
+          <p:cNvSpPr/>
+          <p:nvPr/>
+        </p:nvSpPr>
+        <p:spPr>
+          <a:xfrm>
+            <a:off x="1915757" y="4581128"/>
+            <a:ext cx="1371104" cy="582503"/>
+          </a:xfrm>
+          <a:prstGeom prst="rect">
+            <a:avLst/>
+          </a:prstGeom>
+          <a:solidFill>
+            <a:srgbClr val="FF0000"/>
+          </a:solidFill>
+        </p:spPr>
+        <p:style>
+          <a:lnRef idx="1">
+            <a:schemeClr val="accent1"/>
+          </a:lnRef>
+          <a:fillRef idx="3">
+            <a:schemeClr val="accent1"/>
+          </a:fillRef>
+          <a:effectRef idx="2">
+            <a:schemeClr val="accent1"/>
+          </a:effectRef>
+          <a:fontRef idx="minor">
+            <a:schemeClr val="lt1"/>
+          </a:fontRef>
+        </p:style>
+        <p:txBody>
+          <a:bodyPr rtlCol="0" anchor="ctr"/>
+          <a:lstStyle/>
+          <a:p>
+            <a:pPr algn="ctr"/>
+            <a:r>
+              <a:rPr lang="en-US" dirty="0" smtClean="0"/>
+              <a:t>/</a:t>
+            </a:r>
+            <a:r>
+              <a:rPr lang="en-US" dirty="0" err="1" smtClean="0"/>
+              <a:t>ImageRaw</a:t>
+            </a:r>
+            <a:endParaRPr lang="en-US" dirty="0"/>
+          </a:p>
+        </p:txBody>
+      </p:sp>
+      <p:sp>
+        <p:nvSpPr>
+          <p:cNvPr id="33" name="Rectangle 32"/>
+          <p:cNvSpPr/>
+          <p:nvPr/>
+        </p:nvSpPr>
+        <p:spPr>
+          <a:xfrm>
+            <a:off x="8901490" y="4149080"/>
+            <a:ext cx="1371104" cy="582503"/>
+          </a:xfrm>
+          <a:prstGeom prst="rect">
+            <a:avLst/>
+          </a:prstGeom>
+        </p:spPr>
+        <p:style>
+          <a:lnRef idx="1">
+            <a:schemeClr val="accent1"/>
+          </a:lnRef>
+          <a:fillRef idx="3">
+            <a:schemeClr val="accent1"/>
+          </a:fillRef>
+          <a:effectRef idx="2">
+            <a:schemeClr val="accent1"/>
+          </a:effectRef>
+          <a:fontRef idx="minor">
+            <a:schemeClr val="lt1"/>
+          </a:fontRef>
+        </p:style>
+        <p:txBody>
+          <a:bodyPr rtlCol="0" anchor="ctr"/>
+          <a:lstStyle/>
+          <a:p>
+            <a:pPr algn="ctr"/>
+            <a:r>
+              <a:rPr lang="en-US" dirty="0" smtClean="0"/>
+              <a:t>Sensing</a:t>
+            </a:r>
+            <a:endParaRPr lang="en-US" dirty="0"/>
+          </a:p>
+        </p:txBody>
+      </p:sp>
+      <p:sp>
+        <p:nvSpPr>
+          <p:cNvPr id="35" name="Rectangle 34"/>
+          <p:cNvSpPr/>
+          <p:nvPr/>
+        </p:nvSpPr>
+        <p:spPr>
+          <a:xfrm>
+            <a:off x="10560496" y="5658028"/>
+            <a:ext cx="1371104" cy="582503"/>
+          </a:xfrm>
+          <a:prstGeom prst="rect">
+            <a:avLst/>
+          </a:prstGeom>
+          <a:solidFill>
+            <a:srgbClr val="FF0000"/>
+          </a:solidFill>
+        </p:spPr>
+        <p:style>
+          <a:lnRef idx="1">
+            <a:schemeClr val="accent1"/>
+          </a:lnRef>
+          <a:fillRef idx="3">
+            <a:schemeClr val="accent1"/>
+          </a:fillRef>
+          <a:effectRef idx="2">
+            <a:schemeClr val="accent1"/>
+          </a:effectRef>
+          <a:fontRef idx="minor">
+            <a:schemeClr val="lt1"/>
+          </a:fontRef>
+        </p:style>
+        <p:txBody>
+          <a:bodyPr rtlCol="0" anchor="ctr"/>
+          <a:lstStyle/>
+          <a:p>
+            <a:pPr algn="ctr"/>
+            <a:r>
+              <a:rPr lang="en-US" dirty="0" smtClean="0"/>
+              <a:t>Vision</a:t>
+            </a:r>
+            <a:endParaRPr lang="en-US" dirty="0"/>
+          </a:p>
+        </p:txBody>
+      </p:sp>
+      <p:cxnSp>
+        <p:nvCxnSpPr>
+          <p:cNvPr id="38" name="Straight Arrow Connector 37"/>
+          <p:cNvCxnSpPr>
+            <a:stCxn id="33" idx="2"/>
+            <a:endCxn id="35" idx="0"/>
+          </p:cNvCxnSpPr>
+          <p:nvPr/>
+        </p:nvCxnSpPr>
+        <p:spPr>
+          <a:xfrm>
+            <a:off x="9587042" y="4731583"/>
+            <a:ext cx="1659006" cy="926445"/>
+          </a:xfrm>
+          <a:prstGeom prst="straightConnector1">
+            <a:avLst/>
+          </a:prstGeom>
+          <a:ln>
+            <a:tailEnd type="arrow"/>
+          </a:ln>
+        </p:spPr>
+        <p:style>
+          <a:lnRef idx="2">
+            <a:schemeClr val="accent1"/>
+          </a:lnRef>
+          <a:fillRef idx="0">
+            <a:schemeClr val="accent1"/>
+          </a:fillRef>
+          <a:effectRef idx="1">
+            <a:schemeClr val="accent1"/>
+          </a:effectRef>
+          <a:fontRef idx="minor">
+            <a:schemeClr val="tx1"/>
+          </a:fontRef>
+        </p:style>
+      </p:cxnSp>
+      <p:cxnSp>
+        <p:nvCxnSpPr>
+          <p:cNvPr id="42" name="Straight Arrow Connector 41"/>
+          <p:cNvCxnSpPr>
+            <a:stCxn id="32" idx="3"/>
+            <a:endCxn id="35" idx="1"/>
+          </p:cNvCxnSpPr>
+          <p:nvPr/>
+        </p:nvCxnSpPr>
+        <p:spPr>
+          <a:xfrm>
+            <a:off x="3286861" y="4872380"/>
+            <a:ext cx="7273635" cy="1076900"/>
+          </a:xfrm>
+          <a:prstGeom prst="straightConnector1">
+            <a:avLst/>
+          </a:prstGeom>
+          <a:ln>
+            <a:solidFill>
+              <a:srgbClr val="FF0000"/>
+            </a:solidFill>
+            <a:prstDash val="dash"/>
+            <a:tailEnd type="arrow"/>
+          </a:ln>
+        </p:spPr>
+        <p:style>
+          <a:lnRef idx="2">
+            <a:schemeClr val="accent1"/>
+          </a:lnRef>
+          <a:fillRef idx="0">
+            <a:schemeClr val="accent1"/>
+          </a:fillRef>
+          <a:effectRef idx="1">
+            <a:schemeClr val="accent1"/>
+          </a:effectRef>
+          <a:fontRef idx="minor">
+            <a:schemeClr val="tx1"/>
+          </a:fontRef>
+        </p:style>
+      </p:cxnSp>
     </p:spTree>
     <p:extLst>
       <p:ext uri="{BB962C8B-B14F-4D97-AF65-F5344CB8AC3E}">
@@ -5620,6 +8627,13 @@
   <p:clrMapOvr>
     <a:masterClrMapping/>
   </p:clrMapOvr>
+  <p:timing>
+    <p:tnLst>
+      <p:par>
+        <p:cTn xmlns:p14="http://schemas.microsoft.com/office/powerpoint/2010/main" id="1" dur="indefinite" restart="never" nodeType="tmRoot"/>
+      </p:par>
+    </p:tnLst>
+  </p:timing>
 </p:sld>
 </file>
 
@@ -5941,4 +8955,324 @@
   </a:objectDefaults>
   <a:extraClrSchemeLst/>
 </a:theme>
+</file>
+
+<file path=ppt/theme/theme2.xml><?xml version="1.0" encoding="utf-8"?>
+<a:theme xmlns:a="http://schemas.openxmlformats.org/drawingml/2006/main" name="Office Theme">
+  <a:themeElements>
+    <a:clrScheme name="Office">
+      <a:dk1>
+        <a:sysClr val="windowText" lastClr="000000"/>
+      </a:dk1>
+      <a:lt1>
+        <a:sysClr val="window" lastClr="FFFFFF"/>
+      </a:lt1>
+      <a:dk2>
+        <a:srgbClr val="1F497D"/>
+      </a:dk2>
+      <a:lt2>
+        <a:srgbClr val="EEECE1"/>
+      </a:lt2>
+      <a:accent1>
+        <a:srgbClr val="4F81BD"/>
+      </a:accent1>
+      <a:accent2>
+        <a:srgbClr val="C0504D"/>
+      </a:accent2>
+      <a:accent3>
+        <a:srgbClr val="9BBB59"/>
+      </a:accent3>
+      <a:accent4>
+        <a:srgbClr val="8064A2"/>
+      </a:accent4>
+      <a:accent5>
+        <a:srgbClr val="4BACC6"/>
+      </a:accent5>
+      <a:accent6>
+        <a:srgbClr val="F79646"/>
+      </a:accent6>
+      <a:hlink>
+        <a:srgbClr val="0000FF"/>
+      </a:hlink>
+      <a:folHlink>
+        <a:srgbClr val="800080"/>
+      </a:folHlink>
+    </a:clrScheme>
+    <a:fontScheme name="Office">
+      <a:majorFont>
+        <a:latin typeface="Calibri"/>
+        <a:ea typeface=""/>
+        <a:cs typeface=""/>
+        <a:font script="Jpan" typeface="ＭＳ Ｐゴシック"/>
+        <a:font script="Hang" typeface="맑은 고딕"/>
+        <a:font script="Hans" typeface="宋体"/>
+        <a:font script="Hant" typeface="新細明體"/>
+        <a:font script="Arab" typeface="Times New Roman"/>
+        <a:font script="Hebr" typeface="Times New Roman"/>
+        <a:font script="Thai" typeface="Angsana New"/>
+        <a:font script="Ethi" typeface="Nyala"/>
+        <a:font script="Beng" typeface="Vrinda"/>
+        <a:font script="Gujr" typeface="Shruti"/>
+        <a:font script="Khmr" typeface="MoolBoran"/>
+        <a:font script="Knda" typeface="Tunga"/>
+        <a:font script="Guru" typeface="Raavi"/>
+        <a:font script="Cans" typeface="Euphemia"/>
+        <a:font script="Cher" typeface="Plantagenet Cherokee"/>
+        <a:font script="Yiii" typeface="Microsoft Yi Baiti"/>
+        <a:font script="Tibt" typeface="Microsoft Himalaya"/>
+        <a:font script="Thaa" typeface="MV Boli"/>
+        <a:font script="Deva" typeface="Mangal"/>
+        <a:font script="Telu" typeface="Gautami"/>
+        <a:font script="Taml" typeface="Latha"/>
+        <a:font script="Syrc" typeface="Estrangelo Edessa"/>
+        <a:font script="Orya" typeface="Kalinga"/>
+        <a:font script="Mlym" typeface="Kartika"/>
+        <a:font script="Laoo" typeface="DokChampa"/>
+        <a:font script="Sinh" typeface="Iskoola Pota"/>
+        <a:font script="Mong" typeface="Mongolian Baiti"/>
+        <a:font script="Viet" typeface="Times New Roman"/>
+        <a:font script="Uigh" typeface="Microsoft Uighur"/>
+        <a:font script="Geor" typeface="Sylfaen"/>
+      </a:majorFont>
+      <a:minorFont>
+        <a:latin typeface="Calibri"/>
+        <a:ea typeface=""/>
+        <a:cs typeface=""/>
+        <a:font script="Jpan" typeface="ＭＳ Ｐゴシック"/>
+        <a:font script="Hang" typeface="맑은 고딕"/>
+        <a:font script="Hans" typeface="宋体"/>
+        <a:font script="Hant" typeface="新細明體"/>
+        <a:font script="Arab" typeface="Arial"/>
+        <a:font script="Hebr" typeface="Arial"/>
+        <a:font script="Thai" typeface="Cordia New"/>
+        <a:font script="Ethi" typeface="Nyala"/>
+        <a:font script="Beng" typeface="Vrinda"/>
+        <a:font script="Gujr" typeface="Shruti"/>
+        <a:font script="Khmr" typeface="DaunPenh"/>
+        <a:font script="Knda" typeface="Tunga"/>
+        <a:font script="Guru" typeface="Raavi"/>
+        <a:font script="Cans" typeface="Euphemia"/>
+        <a:font script="Cher" typeface="Plantagenet Cherokee"/>
+        <a:font script="Yiii" typeface="Microsoft Yi Baiti"/>
+        <a:font script="Tibt" typeface="Microsoft Himalaya"/>
+        <a:font script="Thaa" typeface="MV Boli"/>
+        <a:font script="Deva" typeface="Mangal"/>
+        <a:font script="Telu" typeface="Gautami"/>
+        <a:font script="Taml" typeface="Latha"/>
+        <a:font script="Syrc" typeface="Estrangelo Edessa"/>
+        <a:font script="Orya" typeface="Kalinga"/>
+        <a:font script="Mlym" typeface="Kartika"/>
+        <a:font script="Laoo" typeface="DokChampa"/>
+        <a:font script="Sinh" typeface="Iskoola Pota"/>
+        <a:font script="Mong" typeface="Mongolian Baiti"/>
+        <a:font script="Viet" typeface="Arial"/>
+        <a:font script="Uigh" typeface="Microsoft Uighur"/>
+        <a:font script="Geor" typeface="Sylfaen"/>
+      </a:minorFont>
+    </a:fontScheme>
+    <a:fmtScheme name="Office">
+      <a:fillStyleLst>
+        <a:solidFill>
+          <a:schemeClr val="phClr"/>
+        </a:solidFill>
+        <a:gradFill rotWithShape="1">
+          <a:gsLst>
+            <a:gs pos="0">
+              <a:schemeClr val="phClr">
+                <a:tint val="50000"/>
+                <a:satMod val="300000"/>
+              </a:schemeClr>
+            </a:gs>
+            <a:gs pos="35000">
+              <a:schemeClr val="phClr">
+                <a:tint val="37000"/>
+                <a:satMod val="300000"/>
+              </a:schemeClr>
+            </a:gs>
+            <a:gs pos="100000">
+              <a:schemeClr val="phClr">
+                <a:tint val="15000"/>
+                <a:satMod val="350000"/>
+              </a:schemeClr>
+            </a:gs>
+          </a:gsLst>
+          <a:lin ang="16200000" scaled="1"/>
+        </a:gradFill>
+        <a:gradFill rotWithShape="1">
+          <a:gsLst>
+            <a:gs pos="0">
+              <a:schemeClr val="phClr">
+                <a:tint val="100000"/>
+                <a:shade val="100000"/>
+                <a:satMod val="130000"/>
+              </a:schemeClr>
+            </a:gs>
+            <a:gs pos="100000">
+              <a:schemeClr val="phClr">
+                <a:tint val="50000"/>
+                <a:shade val="100000"/>
+                <a:satMod val="350000"/>
+              </a:schemeClr>
+            </a:gs>
+          </a:gsLst>
+          <a:lin ang="16200000" scaled="0"/>
+        </a:gradFill>
+      </a:fillStyleLst>
+      <a:lnStyleLst>
+        <a:ln w="9525" cap="flat" cmpd="sng" algn="ctr">
+          <a:solidFill>
+            <a:schemeClr val="phClr">
+              <a:shade val="95000"/>
+              <a:satMod val="105000"/>
+            </a:schemeClr>
+          </a:solidFill>
+          <a:prstDash val="solid"/>
+        </a:ln>
+        <a:ln w="25400" cap="flat" cmpd="sng" algn="ctr">
+          <a:solidFill>
+            <a:schemeClr val="phClr"/>
+          </a:solidFill>
+          <a:prstDash val="solid"/>
+        </a:ln>
+        <a:ln w="38100" cap="flat" cmpd="sng" algn="ctr">
+          <a:solidFill>
+            <a:schemeClr val="phClr"/>
+          </a:solidFill>
+          <a:prstDash val="solid"/>
+        </a:ln>
+      </a:lnStyleLst>
+      <a:effectStyleLst>
+        <a:effectStyle>
+          <a:effectLst>
+            <a:outerShdw blurRad="40000" dist="20000" dir="5400000" rotWithShape="0">
+              <a:srgbClr val="000000">
+                <a:alpha val="38000"/>
+              </a:srgbClr>
+            </a:outerShdw>
+          </a:effectLst>
+        </a:effectStyle>
+        <a:effectStyle>
+          <a:effectLst>
+            <a:outerShdw blurRad="40000" dist="23000" dir="5400000" rotWithShape="0">
+              <a:srgbClr val="000000">
+                <a:alpha val="35000"/>
+              </a:srgbClr>
+            </a:outerShdw>
+          </a:effectLst>
+        </a:effectStyle>
+        <a:effectStyle>
+          <a:effectLst>
+            <a:outerShdw blurRad="40000" dist="23000" dir="5400000" rotWithShape="0">
+              <a:srgbClr val="000000">
+                <a:alpha val="35000"/>
+              </a:srgbClr>
+            </a:outerShdw>
+          </a:effectLst>
+          <a:scene3d>
+            <a:camera prst="orthographicFront">
+              <a:rot lat="0" lon="0" rev="0"/>
+            </a:camera>
+            <a:lightRig rig="threePt" dir="t">
+              <a:rot lat="0" lon="0" rev="1200000"/>
+            </a:lightRig>
+          </a:scene3d>
+          <a:sp3d>
+            <a:bevelT w="63500" h="25400"/>
+          </a:sp3d>
+        </a:effectStyle>
+      </a:effectStyleLst>
+      <a:bgFillStyleLst>
+        <a:solidFill>
+          <a:schemeClr val="phClr"/>
+        </a:solidFill>
+        <a:gradFill rotWithShape="1">
+          <a:gsLst>
+            <a:gs pos="0">
+              <a:schemeClr val="phClr">
+                <a:tint val="40000"/>
+                <a:satMod val="350000"/>
+              </a:schemeClr>
+            </a:gs>
+            <a:gs pos="40000">
+              <a:schemeClr val="phClr">
+                <a:tint val="45000"/>
+                <a:shade val="99000"/>
+                <a:satMod val="350000"/>
+              </a:schemeClr>
+            </a:gs>
+            <a:gs pos="100000">
+              <a:schemeClr val="phClr">
+                <a:shade val="20000"/>
+                <a:satMod val="255000"/>
+              </a:schemeClr>
+            </a:gs>
+          </a:gsLst>
+          <a:path path="circle">
+            <a:fillToRect l="50000" t="-80000" r="50000" b="180000"/>
+          </a:path>
+        </a:gradFill>
+        <a:gradFill rotWithShape="1">
+          <a:gsLst>
+            <a:gs pos="0">
+              <a:schemeClr val="phClr">
+                <a:tint val="80000"/>
+                <a:satMod val="300000"/>
+              </a:schemeClr>
+            </a:gs>
+            <a:gs pos="100000">
+              <a:schemeClr val="phClr">
+                <a:shade val="30000"/>
+                <a:satMod val="200000"/>
+              </a:schemeClr>
+            </a:gs>
+          </a:gsLst>
+          <a:path path="circle">
+            <a:fillToRect l="50000" t="50000" r="50000" b="50000"/>
+          </a:path>
+        </a:gradFill>
+      </a:bgFillStyleLst>
+    </a:fmtScheme>
+  </a:themeElements>
+  <a:objectDefaults>
+    <a:spDef>
+      <a:spPr/>
+      <a:bodyPr/>
+      <a:lstStyle/>
+      <a:style>
+        <a:lnRef idx="1">
+          <a:schemeClr val="accent1"/>
+        </a:lnRef>
+        <a:fillRef idx="3">
+          <a:schemeClr val="accent1"/>
+        </a:fillRef>
+        <a:effectRef idx="2">
+          <a:schemeClr val="accent1"/>
+        </a:effectRef>
+        <a:fontRef idx="minor">
+          <a:schemeClr val="lt1"/>
+        </a:fontRef>
+      </a:style>
+    </a:spDef>
+    <a:lnDef>
+      <a:spPr/>
+      <a:bodyPr/>
+      <a:lstStyle/>
+      <a:style>
+        <a:lnRef idx="2">
+          <a:schemeClr val="accent1"/>
+        </a:lnRef>
+        <a:fillRef idx="0">
+          <a:schemeClr val="accent1"/>
+        </a:fillRef>
+        <a:effectRef idx="1">
+          <a:schemeClr val="accent1"/>
+        </a:effectRef>
+        <a:fontRef idx="minor">
+          <a:schemeClr val="tx1"/>
+        </a:fontRef>
+      </a:style>
+    </a:lnDef>
+  </a:objectDefaults>
+  <a:extraClrSchemeLst/>
+</a:theme>
 </file>
</xml_diff>